<commit_message>
Added sample query for products of given types
</commit_message>
<xml_diff>
--- a/WDSR - ćwiczenie 3a_REST.pptx
+++ b/WDSR - ćwiczenie 3a_REST.pptx
@@ -5,10 +5,10 @@
     <p:sldMasterId id="2147483669" r:id="rId5"/>
   </p:sldMasterIdLst>
   <p:notesMasterIdLst>
-    <p:notesMasterId r:id="rId41"/>
+    <p:notesMasterId r:id="rId42"/>
   </p:notesMasterIdLst>
   <p:handoutMasterIdLst>
-    <p:handoutMasterId r:id="rId42"/>
+    <p:handoutMasterId r:id="rId43"/>
   </p:handoutMasterIdLst>
   <p:sldIdLst>
     <p:sldId id="286" r:id="rId6"/>
@@ -25,27 +25,28 @@
     <p:sldId id="409" r:id="rId17"/>
     <p:sldId id="410" r:id="rId18"/>
     <p:sldId id="411" r:id="rId19"/>
-    <p:sldId id="412" r:id="rId20"/>
-    <p:sldId id="414" r:id="rId21"/>
-    <p:sldId id="415" r:id="rId22"/>
-    <p:sldId id="416" r:id="rId23"/>
-    <p:sldId id="429" r:id="rId24"/>
-    <p:sldId id="404" r:id="rId25"/>
-    <p:sldId id="405" r:id="rId26"/>
-    <p:sldId id="418" r:id="rId27"/>
-    <p:sldId id="419" r:id="rId28"/>
-    <p:sldId id="420" r:id="rId29"/>
-    <p:sldId id="421" r:id="rId30"/>
-    <p:sldId id="422" r:id="rId31"/>
-    <p:sldId id="423" r:id="rId32"/>
-    <p:sldId id="424" r:id="rId33"/>
-    <p:sldId id="426" r:id="rId34"/>
-    <p:sldId id="427" r:id="rId35"/>
-    <p:sldId id="428" r:id="rId36"/>
-    <p:sldId id="430" r:id="rId37"/>
-    <p:sldId id="431" r:id="rId38"/>
-    <p:sldId id="432" r:id="rId39"/>
-    <p:sldId id="324" r:id="rId40"/>
+    <p:sldId id="440" r:id="rId20"/>
+    <p:sldId id="412" r:id="rId21"/>
+    <p:sldId id="414" r:id="rId22"/>
+    <p:sldId id="415" r:id="rId23"/>
+    <p:sldId id="416" r:id="rId24"/>
+    <p:sldId id="429" r:id="rId25"/>
+    <p:sldId id="404" r:id="rId26"/>
+    <p:sldId id="405" r:id="rId27"/>
+    <p:sldId id="418" r:id="rId28"/>
+    <p:sldId id="419" r:id="rId29"/>
+    <p:sldId id="420" r:id="rId30"/>
+    <p:sldId id="421" r:id="rId31"/>
+    <p:sldId id="422" r:id="rId32"/>
+    <p:sldId id="423" r:id="rId33"/>
+    <p:sldId id="424" r:id="rId34"/>
+    <p:sldId id="426" r:id="rId35"/>
+    <p:sldId id="427" r:id="rId36"/>
+    <p:sldId id="428" r:id="rId37"/>
+    <p:sldId id="430" r:id="rId38"/>
+    <p:sldId id="431" r:id="rId39"/>
+    <p:sldId id="432" r:id="rId40"/>
+    <p:sldId id="324" r:id="rId41"/>
   </p:sldIdLst>
   <p:sldSz cx="9144000" cy="5143500" type="screen16x9"/>
   <p:notesSz cx="6858000" cy="9144000"/>
@@ -146,7 +147,7 @@
   </p:defaultTextStyle>
   <p:extLst>
     <p:ext uri="{EFAFB233-063F-42B5-8137-9DF3F51BA10A}">
-      <p15:sldGuideLst xmlns:p15="http://schemas.microsoft.com/office/powerpoint/2012/main">
+      <p15:sldGuideLst xmlns:p15="http://schemas.microsoft.com/office/powerpoint/2012/main" xmlns="">
         <p15:guide id="1" orient="horz" pos="1620">
           <p15:clr>
             <a:srgbClr val="A4A3A4"/>
@@ -180,7 +181,7 @@
       </p15:sldGuideLst>
     </p:ext>
     <p:ext uri="{2D200454-40CA-4A62-9FC3-DE9A4176ACB9}">
-      <p15:notesGuideLst xmlns:p15="http://schemas.microsoft.com/office/powerpoint/2012/main"/>
+      <p15:notesGuideLst xmlns:p15="http://schemas.microsoft.com/office/powerpoint/2012/main" xmlns=""/>
     </p:ext>
   </p:extLst>
 </p:presentation>
@@ -275,7 +276,7 @@
             <a:fld id="{C4843D26-F355-3844-A4EF-19D4FD875597}" type="datetimeFigureOut">
               <a:rPr lang="de-DE" smtClean="0"/>
               <a:pPr/>
-              <a:t>04.04.2016</a:t>
+              <a:t>12.04.2016</a:t>
             </a:fld>
             <a:endParaRPr lang="de-DE" dirty="0"/>
           </a:p>
@@ -443,7 +444,7 @@
             <a:fld id="{8E2CFE12-C1FB-D740-8B6C-AFB72D5D4002}" type="datetimeFigureOut">
               <a:rPr lang="de-DE" smtClean="0"/>
               <a:pPr/>
-              <a:t>04.04.2016</a:t>
+              <a:t>12.04.2016</a:t>
             </a:fld>
             <a:endParaRPr lang="de-DE" dirty="0"/>
           </a:p>
@@ -3062,6 +3063,93 @@
 </p:notes>
 </file>
 
+<file path=ppt/notesSlides/notesSlide34.xml><?xml version="1.0" encoding="utf-8"?>
+<p:notes xmlns:a="http://schemas.openxmlformats.org/drawingml/2006/main" xmlns:r="http://schemas.openxmlformats.org/officeDocument/2006/relationships" xmlns:p="http://schemas.openxmlformats.org/presentationml/2006/main">
+  <p:cSld>
+    <p:spTree>
+      <p:nvGrpSpPr>
+        <p:cNvPr id="1" name=""/>
+        <p:cNvGrpSpPr/>
+        <p:nvPr/>
+      </p:nvGrpSpPr>
+      <p:grpSpPr>
+        <a:xfrm>
+          <a:off x="0" y="0"/>
+          <a:ext cx="0" cy="0"/>
+          <a:chOff x="0" y="0"/>
+          <a:chExt cx="0" cy="0"/>
+        </a:xfrm>
+      </p:grpSpPr>
+      <p:sp>
+        <p:nvSpPr>
+          <p:cNvPr id="2" name="Folienbildplatzhalter 1"/>
+          <p:cNvSpPr>
+            <a:spLocks noGrp="1" noRot="1" noChangeAspect="1"/>
+          </p:cNvSpPr>
+          <p:nvPr>
+            <p:ph type="sldImg"/>
+          </p:nvPr>
+        </p:nvSpPr>
+        <p:spPr/>
+      </p:sp>
+      <p:sp>
+        <p:nvSpPr>
+          <p:cNvPr id="3" name="Notizenplatzhalter 2"/>
+          <p:cNvSpPr>
+            <a:spLocks noGrp="1"/>
+          </p:cNvSpPr>
+          <p:nvPr>
+            <p:ph type="body" idx="1"/>
+          </p:nvPr>
+        </p:nvSpPr>
+        <p:spPr/>
+        <p:txBody>
+          <a:bodyPr>
+            <a:normAutofit/>
+          </a:bodyPr>
+          <a:lstStyle/>
+          <a:p>
+            <a:endParaRPr lang="de-DE" dirty="0"/>
+          </a:p>
+        </p:txBody>
+      </p:sp>
+      <p:sp>
+        <p:nvSpPr>
+          <p:cNvPr id="4" name="Foliennummernplatzhalter 3"/>
+          <p:cNvSpPr>
+            <a:spLocks noGrp="1"/>
+          </p:cNvSpPr>
+          <p:nvPr>
+            <p:ph type="sldNum" sz="quarter" idx="10"/>
+          </p:nvPr>
+        </p:nvSpPr>
+        <p:spPr/>
+        <p:txBody>
+          <a:bodyPr/>
+          <a:lstStyle/>
+          <a:p>
+            <a:fld id="{150BA478-331B-4C41-B0D5-A69E59A4437F}" type="slidenum">
+              <a:rPr lang="de-DE" smtClean="0"/>
+              <a:pPr/>
+              <a:t>35</a:t>
+            </a:fld>
+            <a:endParaRPr lang="de-DE" dirty="0"/>
+          </a:p>
+        </p:txBody>
+      </p:sp>
+    </p:spTree>
+    <p:extLst>
+      <p:ext uri="{BB962C8B-B14F-4D97-AF65-F5344CB8AC3E}">
+        <p14:creationId xmlns:p14="http://schemas.microsoft.com/office/powerpoint/2010/main" val="1883132698"/>
+      </p:ext>
+    </p:extLst>
+  </p:cSld>
+  <p:clrMapOvr>
+    <a:masterClrMapping/>
+  </p:clrMapOvr>
+</p:notes>
+</file>
+
 <file path=ppt/notesSlides/notesSlide4.xml><?xml version="1.0" encoding="utf-8"?>
 <p:notes xmlns:a="http://schemas.openxmlformats.org/drawingml/2006/main" xmlns:r="http://schemas.openxmlformats.org/officeDocument/2006/relationships" xmlns:p="http://schemas.openxmlformats.org/presentationml/2006/main">
   <p:cSld>
@@ -4349,7 +4437,7 @@
   </p:timing>
   <p:extLst mod="1">
     <p:ext uri="{DCECCB84-F9BA-43D5-87BE-67443E8EF086}">
-      <p15:sldGuideLst xmlns:p15="http://schemas.microsoft.com/office/powerpoint/2012/main">
+      <p15:sldGuideLst xmlns:p15="http://schemas.microsoft.com/office/powerpoint/2012/main" xmlns="">
         <p15:guide id="1" orient="horz" pos="1221">
           <p15:clr>
             <a:srgbClr val="C35EA4"/>
@@ -4682,7 +4770,7 @@
   </p:clrMapOvr>
   <p:extLst mod="1">
     <p:ext uri="{DCECCB84-F9BA-43D5-87BE-67443E8EF086}">
-      <p15:sldGuideLst xmlns:p15="http://schemas.microsoft.com/office/powerpoint/2012/main">
+      <p15:sldGuideLst xmlns:p15="http://schemas.microsoft.com/office/powerpoint/2012/main" xmlns="">
         <p15:guide id="1" orient="horz" pos="1221">
           <p15:clr>
             <a:srgbClr val="C35EA4"/>
@@ -5421,7 +5509,7 @@
           <a:graphicData uri="http://schemas.openxmlformats.org/presentationml/2006/ole">
             <mc:AlternateContent xmlns:mc="http://schemas.openxmlformats.org/markup-compatibility/2006">
               <mc:Choice xmlns:v="urn:schemas-microsoft-com:vml" Requires="v">
-                <p:oleObj spid="_x0000_s2286" name="think-cell Folie" r:id="rId4" imgW="305" imgH="303" progId="TCLayout.ActiveDocument.1">
+                <p:oleObj spid="_x0000_s2288" name="think-cell Folie" r:id="rId4" imgW="305" imgH="303" progId="TCLayout.ActiveDocument.1">
                   <p:embed/>
                 </p:oleObj>
               </mc:Choice>
@@ -5818,7 +5906,7 @@
           <a:graphicData uri="http://schemas.openxmlformats.org/presentationml/2006/ole">
             <mc:AlternateContent xmlns:mc="http://schemas.openxmlformats.org/markup-compatibility/2006">
               <mc:Choice xmlns:v="urn:schemas-microsoft-com:vml" Requires="v">
-                <p:oleObj spid="_x0000_s1267" name="think-cell Folie" r:id="rId13" imgW="305" imgH="303" progId="TCLayout.ActiveDocument.1">
+                <p:oleObj spid="_x0000_s1269" name="think-cell Folie" r:id="rId13" imgW="305" imgH="303" progId="TCLayout.ActiveDocument.1">
                   <p:embed/>
                 </p:oleObj>
               </mc:Choice>
@@ -7026,7 +7114,7 @@
   </p:txStyles>
   <p:extLst mod="1">
     <p:ext uri="{27BBF7A9-308A-43DC-89C8-2F10F3537804}">
-      <p15:sldGuideLst xmlns:p15="http://schemas.microsoft.com/office/powerpoint/2012/main">
+      <p15:sldGuideLst xmlns:p15="http://schemas.microsoft.com/office/powerpoint/2012/main" xmlns="">
         <p15:guide id="1" pos="283">
           <p15:clr>
             <a:srgbClr val="FBAE40"/>
@@ -7154,8 +7242,12 @@
           </a:p>
           <a:p>
             <a:r>
-              <a:rPr lang="pl-PL" dirty="0" smtClean="0"/>
-              <a:t>Wersja 1.0</a:t>
+              <a:rPr lang="pl-PL" smtClean="0"/>
+              <a:t>Wersja </a:t>
+            </a:r>
+            <a:r>
+              <a:rPr lang="pl-PL" smtClean="0"/>
+              <a:t>1.1</a:t>
             </a:r>
             <a:endParaRPr lang="de-DE" dirty="0"/>
           </a:p>
@@ -9729,6 +9821,255 @@
         <p:spPr>
           <a:xfrm>
             <a:off x="443708" y="1119187"/>
+            <a:ext cx="4428918" cy="3362325"/>
+          </a:xfrm>
+        </p:spPr>
+        <p:txBody>
+          <a:bodyPr>
+            <a:normAutofit/>
+          </a:bodyPr>
+          <a:lstStyle/>
+          <a:p>
+            <a:r>
+              <a:rPr lang="pl-PL" sz="1050" dirty="0" smtClean="0"/>
+              <a:t>Zapytanie o produkty wybranych typów:</a:t>
+            </a:r>
+            <a:endParaRPr lang="pl-PL" sz="1050" dirty="0" smtClean="0"/>
+          </a:p>
+          <a:p>
+            <a:pPr lvl="1"/>
+            <a:r>
+              <a:rPr lang="pl-PL" sz="850" dirty="0" smtClean="0">
+                <a:hlinkClick r:id="rId3"/>
+              </a:rPr>
+              <a:t>GET http://</a:t>
+            </a:r>
+            <a:r>
+              <a:rPr lang="pl-PL" sz="850" dirty="0" smtClean="0">
+                <a:hlinkClick r:id="rId3"/>
+              </a:rPr>
+              <a:t>localhost:8090/products</a:t>
+            </a:r>
+            <a:r>
+              <a:rPr lang="pl-PL" sz="850" dirty="0" smtClean="0"/>
+              <a:t>?type=METAL&amp;type=FOOD</a:t>
+            </a:r>
+            <a:endParaRPr lang="pl-PL" sz="850" dirty="0" smtClean="0"/>
+          </a:p>
+          <a:p>
+            <a:pPr lvl="1"/>
+            <a:r>
+              <a:rPr lang="pl-PL" sz="850" dirty="0" smtClean="0"/>
+              <a:t>Odpowiedź serwera ma status 200 OK i zawiera tablicę </a:t>
+            </a:r>
+            <a:r>
+              <a:rPr lang="pl-PL" sz="850" dirty="0" smtClean="0"/>
+              <a:t>wszystkich produktów typu METAL lub FOOD.</a:t>
+            </a:r>
+          </a:p>
+          <a:p>
+            <a:pPr lvl="2"/>
+            <a:r>
+              <a:rPr lang="pl-PL" sz="800" dirty="0" smtClean="0"/>
+              <a:t>Zauważ – nie ma produktów typu ENERGY</a:t>
+            </a:r>
+            <a:endParaRPr lang="pl-PL" sz="1050" dirty="0" smtClean="0"/>
+          </a:p>
+          <a:p>
+            <a:pPr lvl="2"/>
+            <a:endParaRPr lang="pl-PL" sz="850" dirty="0" smtClean="0"/>
+          </a:p>
+          <a:p>
+            <a:pPr lvl="1"/>
+            <a:endParaRPr lang="pl-PL" sz="850" dirty="0" smtClean="0"/>
+          </a:p>
+          <a:p>
+            <a:endParaRPr lang="pl-PL" dirty="0" smtClean="0"/>
+          </a:p>
+          <a:p>
+            <a:pPr marL="0" indent="0">
+              <a:buNone/>
+            </a:pPr>
+            <a:endParaRPr lang="pl-PL" dirty="0" smtClean="0"/>
+          </a:p>
+          <a:p>
+            <a:endParaRPr lang="pl-PL" dirty="0" smtClean="0"/>
+          </a:p>
+          <a:p>
+            <a:endParaRPr lang="pl-PL" dirty="0" smtClean="0"/>
+          </a:p>
+        </p:txBody>
+      </p:sp>
+      <p:pic>
+        <p:nvPicPr>
+          <p:cNvPr id="3074" name="Picture 2"/>
+          <p:cNvPicPr>
+            <a:picLocks noChangeAspect="1" noChangeArrowheads="1"/>
+          </p:cNvPicPr>
+          <p:nvPr/>
+        </p:nvPicPr>
+        <p:blipFill>
+          <a:blip r:embed="rId4">
+            <a:extLst>
+              <a:ext uri="{28A0092B-C50C-407E-A947-70E740481C1C}">
+                <a14:useLocalDpi xmlns:a14="http://schemas.microsoft.com/office/drawing/2010/main" val="0"/>
+              </a:ext>
+            </a:extLst>
+          </a:blip>
+          <a:srcRect/>
+          <a:stretch>
+            <a:fillRect/>
+          </a:stretch>
+        </p:blipFill>
+        <p:spPr bwMode="auto">
+          <a:xfrm>
+            <a:off x="1333500" y="1919287"/>
+            <a:ext cx="6477000" cy="2562225"/>
+          </a:xfrm>
+          <a:prstGeom prst="rect">
+            <a:avLst/>
+          </a:prstGeom>
+          <a:noFill/>
+          <a:ln>
+            <a:noFill/>
+          </a:ln>
+          <a:extLst>
+            <a:ext uri="{909E8E84-426E-40DD-AFC4-6F175D3DCCD1}">
+              <a14:hiddenFill xmlns:a14="http://schemas.microsoft.com/office/drawing/2010/main">
+                <a:solidFill>
+                  <a:schemeClr val="accent1"/>
+                </a:solidFill>
+              </a14:hiddenFill>
+            </a:ext>
+            <a:ext uri="{91240B29-F687-4F45-9708-019B960494DF}">
+              <a14:hiddenLine xmlns:a14="http://schemas.microsoft.com/office/drawing/2010/main" w="9525">
+                <a:solidFill>
+                  <a:schemeClr val="tx1"/>
+                </a:solidFill>
+                <a:miter lim="800000"/>
+                <a:headEnd/>
+                <a:tailEnd/>
+              </a14:hiddenLine>
+            </a:ext>
+          </a:extLst>
+        </p:spPr>
+      </p:pic>
+    </p:spTree>
+    <p:extLst>
+      <p:ext uri="{BB962C8B-B14F-4D97-AF65-F5344CB8AC3E}">
+        <p14:creationId xmlns:p14="http://schemas.microsoft.com/office/powerpoint/2010/main" val="245669067"/>
+      </p:ext>
+    </p:extLst>
+  </p:cSld>
+  <p:clrMapOvr>
+    <a:masterClrMapping/>
+  </p:clrMapOvr>
+  <mc:AlternateContent xmlns:mc="http://schemas.openxmlformats.org/markup-compatibility/2006" xmlns:p14="http://schemas.microsoft.com/office/powerpoint/2010/main">
+    <mc:Choice Requires="p14">
+      <p:transition p14:dur="10"/>
+    </mc:Choice>
+    <mc:Fallback xmlns="">
+      <p:transition/>
+    </mc:Fallback>
+  </mc:AlternateContent>
+  <p:timing>
+    <p:tnLst>
+      <p:par>
+        <p:cTn id="1" dur="indefinite" restart="never" nodeType="tmRoot"/>
+      </p:par>
+    </p:tnLst>
+  </p:timing>
+</p:sld>
+</file>
+
+<file path=ppt/slides/slide16.xml><?xml version="1.0" encoding="utf-8"?>
+<p:sld xmlns:a="http://schemas.openxmlformats.org/drawingml/2006/main" xmlns:r="http://schemas.openxmlformats.org/officeDocument/2006/relationships" xmlns:p="http://schemas.openxmlformats.org/presentationml/2006/main">
+  <p:cSld>
+    <p:spTree>
+      <p:nvGrpSpPr>
+        <p:cNvPr id="1" name=""/>
+        <p:cNvGrpSpPr/>
+        <p:nvPr/>
+      </p:nvGrpSpPr>
+      <p:grpSpPr>
+        <a:xfrm>
+          <a:off x="0" y="0"/>
+          <a:ext cx="0" cy="0"/>
+          <a:chOff x="0" y="0"/>
+          <a:chExt cx="0" cy="0"/>
+        </a:xfrm>
+      </p:grpSpPr>
+      <p:sp>
+        <p:nvSpPr>
+          <p:cNvPr id="7" name="Titel 6"/>
+          <p:cNvSpPr>
+            <a:spLocks noGrp="1"/>
+          </p:cNvSpPr>
+          <p:nvPr>
+            <p:ph type="title"/>
+          </p:nvPr>
+        </p:nvSpPr>
+        <p:spPr>
+          <a:xfrm>
+            <a:off x="444503" y="347341"/>
+            <a:ext cx="6692104" cy="436017"/>
+          </a:xfrm>
+        </p:spPr>
+        <p:txBody>
+          <a:bodyPr/>
+          <a:lstStyle/>
+          <a:p>
+            <a:r>
+              <a:rPr lang="pl-PL" dirty="0" smtClean="0"/>
+              <a:t>Ćwiczenie REST Client</a:t>
+            </a:r>
+            <a:br>
+              <a:rPr lang="pl-PL" dirty="0" smtClean="0"/>
+            </a:br>
+            <a:r>
+              <a:rPr lang="pl-PL" dirty="0" smtClean="0"/>
+              <a:t>Ćwiczenia z używania REST API</a:t>
+            </a:r>
+            <a:endParaRPr lang="de-DE" dirty="0"/>
+          </a:p>
+        </p:txBody>
+      </p:sp>
+      <p:sp>
+        <p:nvSpPr>
+          <p:cNvPr id="5" name="Inhaltsplatzhalter 4"/>
+          <p:cNvSpPr>
+            <a:spLocks noGrp="1"/>
+          </p:cNvSpPr>
+          <p:nvPr>
+            <p:ph type="body" sz="quarter" idx="13"/>
+          </p:nvPr>
+        </p:nvSpPr>
+        <p:spPr/>
+        <p:txBody>
+          <a:bodyPr/>
+          <a:lstStyle/>
+          <a:p>
+            <a:r>
+              <a:rPr lang="pl-PL" dirty="0" smtClean="0"/>
+              <a:t>ĆWICZENIE 3</a:t>
+            </a:r>
+            <a:endParaRPr lang="de-DE" dirty="0"/>
+          </a:p>
+        </p:txBody>
+      </p:sp>
+      <p:sp>
+        <p:nvSpPr>
+          <p:cNvPr id="30" name="Symbol zastępczy zawartości 1"/>
+          <p:cNvSpPr>
+            <a:spLocks noGrp="1"/>
+          </p:cNvSpPr>
+          <p:nvPr>
+            <p:ph idx="1"/>
+          </p:nvPr>
+        </p:nvSpPr>
+        <p:spPr>
+          <a:xfrm>
+            <a:off x="443708" y="1119187"/>
             <a:ext cx="3777563" cy="3362325"/>
           </a:xfrm>
         </p:spPr>
@@ -9923,7 +10264,7 @@
 </p:sld>
 </file>
 
-<file path=ppt/slides/slide16.xml><?xml version="1.0" encoding="utf-8"?>
+<file path=ppt/slides/slide17.xml><?xml version="1.0" encoding="utf-8"?>
 <p:sld xmlns:a="http://schemas.openxmlformats.org/drawingml/2006/main" xmlns:r="http://schemas.openxmlformats.org/officeDocument/2006/relationships" xmlns:p="http://schemas.openxmlformats.org/presentationml/2006/main">
   <p:cSld>
     <p:spTree>
@@ -10155,7 +10496,7 @@
 </p:sld>
 </file>
 
-<file path=ppt/slides/slide17.xml><?xml version="1.0" encoding="utf-8"?>
+<file path=ppt/slides/slide18.xml><?xml version="1.0" encoding="utf-8"?>
 <p:sld xmlns:a="http://schemas.openxmlformats.org/drawingml/2006/main" xmlns:r="http://schemas.openxmlformats.org/officeDocument/2006/relationships" xmlns:p="http://schemas.openxmlformats.org/presentationml/2006/main">
   <p:cSld>
     <p:spTree>
@@ -10384,7 +10725,7 @@
 </p:sld>
 </file>
 
-<file path=ppt/slides/slide18.xml><?xml version="1.0" encoding="utf-8"?>
+<file path=ppt/slides/slide19.xml><?xml version="1.0" encoding="utf-8"?>
 <p:sld xmlns:a="http://schemas.openxmlformats.org/drawingml/2006/main" xmlns:r="http://schemas.openxmlformats.org/officeDocument/2006/relationships" xmlns:p="http://schemas.openxmlformats.org/presentationml/2006/main">
   <p:cSld>
     <p:spTree>
@@ -10619,305 +10960,6 @@
 </p:sld>
 </file>
 
-<file path=ppt/slides/slide19.xml><?xml version="1.0" encoding="utf-8"?>
-<p:sld xmlns:a="http://schemas.openxmlformats.org/drawingml/2006/main" xmlns:r="http://schemas.openxmlformats.org/officeDocument/2006/relationships" xmlns:p="http://schemas.openxmlformats.org/presentationml/2006/main">
-  <p:cSld>
-    <p:spTree>
-      <p:nvGrpSpPr>
-        <p:cNvPr id="1" name=""/>
-        <p:cNvGrpSpPr/>
-        <p:nvPr/>
-      </p:nvGrpSpPr>
-      <p:grpSpPr>
-        <a:xfrm>
-          <a:off x="0" y="0"/>
-          <a:ext cx="0" cy="0"/>
-          <a:chOff x="0" y="0"/>
-          <a:chExt cx="0" cy="0"/>
-        </a:xfrm>
-      </p:grpSpPr>
-      <p:sp>
-        <p:nvSpPr>
-          <p:cNvPr id="7" name="Titel 6"/>
-          <p:cNvSpPr>
-            <a:spLocks noGrp="1"/>
-          </p:cNvSpPr>
-          <p:nvPr>
-            <p:ph type="title"/>
-          </p:nvPr>
-        </p:nvSpPr>
-        <p:spPr>
-          <a:xfrm>
-            <a:off x="444503" y="347341"/>
-            <a:ext cx="6692104" cy="436017"/>
-          </a:xfrm>
-        </p:spPr>
-        <p:txBody>
-          <a:bodyPr/>
-          <a:lstStyle/>
-          <a:p>
-            <a:r>
-              <a:rPr lang="pl-PL" dirty="0" smtClean="0"/>
-              <a:t>Ćwiczenie REST Client</a:t>
-            </a:r>
-            <a:br>
-              <a:rPr lang="pl-PL" dirty="0" smtClean="0"/>
-            </a:br>
-            <a:r>
-              <a:rPr lang="pl-PL" dirty="0" smtClean="0"/>
-              <a:t>Ćwiczenia z używania REST API</a:t>
-            </a:r>
-            <a:endParaRPr lang="de-DE" dirty="0"/>
-          </a:p>
-        </p:txBody>
-      </p:sp>
-      <p:sp>
-        <p:nvSpPr>
-          <p:cNvPr id="5" name="Inhaltsplatzhalter 4"/>
-          <p:cNvSpPr>
-            <a:spLocks noGrp="1"/>
-          </p:cNvSpPr>
-          <p:nvPr>
-            <p:ph type="body" sz="quarter" idx="13"/>
-          </p:nvPr>
-        </p:nvSpPr>
-        <p:spPr/>
-        <p:txBody>
-          <a:bodyPr/>
-          <a:lstStyle/>
-          <a:p>
-            <a:r>
-              <a:rPr lang="pl-PL" dirty="0" smtClean="0"/>
-              <a:t>ĆWICZENIE 3</a:t>
-            </a:r>
-            <a:endParaRPr lang="de-DE" dirty="0"/>
-          </a:p>
-        </p:txBody>
-      </p:sp>
-      <p:sp>
-        <p:nvSpPr>
-          <p:cNvPr id="30" name="Symbol zastępczy zawartości 1"/>
-          <p:cNvSpPr>
-            <a:spLocks noGrp="1"/>
-          </p:cNvSpPr>
-          <p:nvPr>
-            <p:ph idx="1"/>
-          </p:nvPr>
-        </p:nvSpPr>
-        <p:spPr>
-          <a:xfrm>
-            <a:off x="493812" y="1482442"/>
-            <a:ext cx="7861048" cy="2525887"/>
-          </a:xfrm>
-        </p:spPr>
-        <p:txBody>
-          <a:bodyPr>
-            <a:normAutofit/>
-          </a:bodyPr>
-          <a:lstStyle/>
-          <a:p>
-            <a:r>
-              <a:rPr lang="pl-PL" dirty="0" smtClean="0"/>
-              <a:t>Zobacz co się stanie przy różnych innych zapytaniach:</a:t>
-            </a:r>
-          </a:p>
-          <a:p>
-            <a:pPr lvl="1"/>
-            <a:endParaRPr lang="pl-PL" sz="1000" dirty="0" smtClean="0"/>
-          </a:p>
-          <a:p>
-            <a:pPr lvl="2"/>
-            <a:r>
-              <a:rPr lang="pl-PL" sz="1050" dirty="0" smtClean="0"/>
-              <a:t>POST </a:t>
-            </a:r>
-            <a:r>
-              <a:rPr lang="pl-PL" sz="1050" dirty="0" smtClean="0">
-                <a:hlinkClick r:id="rId3"/>
-              </a:rPr>
-              <a:t>http://localhost:8090/products</a:t>
-            </a:r>
-            <a:r>
-              <a:rPr lang="pl-PL" sz="1050" dirty="0" smtClean="0"/>
-              <a:t>, powtórz jeszcze raz z tymi samymi danymi.</a:t>
-            </a:r>
-          </a:p>
-          <a:p>
-            <a:pPr lvl="2"/>
-            <a:r>
-              <a:rPr lang="pl-PL" sz="1050" dirty="0" smtClean="0"/>
-              <a:t>PUT </a:t>
-            </a:r>
-            <a:r>
-              <a:rPr lang="pl-PL" sz="1050" dirty="0" smtClean="0">
-                <a:hlinkClick r:id="rId4"/>
-              </a:rPr>
-              <a:t>http://localhost:8090/products/1</a:t>
-            </a:r>
-            <a:r>
-              <a:rPr lang="pl-PL" sz="1050" dirty="0" smtClean="0"/>
-              <a:t>, </a:t>
-            </a:r>
-            <a:r>
-              <a:rPr lang="pl-PL" sz="1050" dirty="0" smtClean="0"/>
-              <a:t>powtórz jeszcze raz z tymi samymi danymi.</a:t>
-            </a:r>
-          </a:p>
-          <a:p>
-            <a:pPr lvl="2"/>
-            <a:r>
-              <a:rPr lang="pl-PL" sz="1050" dirty="0" smtClean="0"/>
-              <a:t>DELETE </a:t>
-            </a:r>
-            <a:r>
-              <a:rPr lang="pl-PL" sz="1050" dirty="0">
-                <a:hlinkClick r:id="rId3"/>
-              </a:rPr>
-              <a:t>http://</a:t>
-            </a:r>
-            <a:r>
-              <a:rPr lang="pl-PL" sz="1050" dirty="0" smtClean="0">
-                <a:hlinkClick r:id="rId3"/>
-              </a:rPr>
-              <a:t>localhost:8090/products</a:t>
-            </a:r>
-            <a:endParaRPr lang="pl-PL" sz="1050" dirty="0"/>
-          </a:p>
-          <a:p>
-            <a:pPr lvl="2"/>
-            <a:r>
-              <a:rPr lang="pl-PL" sz="1050" dirty="0" smtClean="0"/>
-              <a:t>GET </a:t>
-            </a:r>
-            <a:r>
-              <a:rPr lang="pl-PL" sz="1050" dirty="0">
-                <a:hlinkClick r:id="rId5"/>
-              </a:rPr>
-              <a:t>http://</a:t>
-            </a:r>
-            <a:r>
-              <a:rPr lang="pl-PL" sz="1050" dirty="0" smtClean="0">
-                <a:hlinkClick r:id="rId5"/>
-              </a:rPr>
-              <a:t>localhost:8090/foo</a:t>
-            </a:r>
-            <a:endParaRPr lang="pl-PL" sz="1050" dirty="0" smtClean="0"/>
-          </a:p>
-          <a:p>
-            <a:pPr lvl="2"/>
-            <a:r>
-              <a:rPr lang="pl-PL" sz="1050" dirty="0" smtClean="0"/>
-              <a:t>PUT </a:t>
-            </a:r>
-            <a:r>
-              <a:rPr lang="pl-PL" sz="1050" dirty="0" smtClean="0">
-                <a:hlinkClick r:id="rId6"/>
-              </a:rPr>
-              <a:t>http://localhost:8090/products/2</a:t>
-            </a:r>
-            <a:r>
-              <a:rPr lang="pl-PL" sz="1050" dirty="0" smtClean="0"/>
-              <a:t> (Content-</a:t>
-            </a:r>
-            <a:r>
-              <a:rPr lang="pl-PL" sz="1050" dirty="0" err="1" smtClean="0"/>
-              <a:t>Type</a:t>
-            </a:r>
-            <a:r>
-              <a:rPr lang="pl-PL" sz="1050" dirty="0" smtClean="0"/>
-              <a:t>=</a:t>
-            </a:r>
-            <a:r>
-              <a:rPr lang="pl-PL" sz="1050" dirty="0" err="1" smtClean="0"/>
-              <a:t>application</a:t>
-            </a:r>
-            <a:r>
-              <a:rPr lang="pl-PL" sz="1050" dirty="0" smtClean="0"/>
-              <a:t>/</a:t>
-            </a:r>
-            <a:r>
-              <a:rPr lang="pl-PL" sz="1050" dirty="0" err="1" smtClean="0"/>
-              <a:t>xml</a:t>
-            </a:r>
-            <a:r>
-              <a:rPr lang="pl-PL" sz="1050" dirty="0" smtClean="0"/>
-              <a:t>)</a:t>
-            </a:r>
-          </a:p>
-          <a:p>
-            <a:pPr lvl="2"/>
-            <a:r>
-              <a:rPr lang="pl-PL" sz="1050" dirty="0"/>
-              <a:t>DELETE </a:t>
-            </a:r>
-            <a:r>
-              <a:rPr lang="pl-PL" sz="1050" dirty="0">
-                <a:hlinkClick r:id="rId4"/>
-              </a:rPr>
-              <a:t>http://</a:t>
-            </a:r>
-            <a:r>
-              <a:rPr lang="pl-PL" sz="1050" dirty="0" smtClean="0">
-                <a:hlinkClick r:id="rId4"/>
-              </a:rPr>
-              <a:t>localhost:8090/products/1</a:t>
-            </a:r>
-            <a:r>
-              <a:rPr lang="pl-PL" sz="1050" dirty="0" smtClean="0"/>
-              <a:t>, powtórzone </a:t>
-            </a:r>
-            <a:r>
-              <a:rPr lang="pl-PL" sz="1050" dirty="0"/>
-              <a:t>DELETE </a:t>
-            </a:r>
-            <a:r>
-              <a:rPr lang="pl-PL" sz="1050" dirty="0">
-                <a:hlinkClick r:id="rId3"/>
-              </a:rPr>
-              <a:t>http://</a:t>
-            </a:r>
-            <a:r>
-              <a:rPr lang="pl-PL" sz="1050" dirty="0" smtClean="0">
-                <a:hlinkClick r:id="rId3"/>
-              </a:rPr>
-              <a:t>localhost:8090/products</a:t>
-            </a:r>
-            <a:r>
-              <a:rPr lang="pl-PL" sz="1050" dirty="0" smtClean="0"/>
-              <a:t>/1</a:t>
-            </a:r>
-            <a:endParaRPr lang="pl-PL" sz="1050" dirty="0"/>
-          </a:p>
-        </p:txBody>
-      </p:sp>
-    </p:spTree>
-    <p:extLst>
-      <p:ext uri="{BB962C8B-B14F-4D97-AF65-F5344CB8AC3E}">
-        <p14:creationId xmlns:p14="http://schemas.microsoft.com/office/powerpoint/2010/main" val="1765496199"/>
-      </p:ext>
-    </p:extLst>
-  </p:cSld>
-  <p:clrMapOvr>
-    <a:masterClrMapping/>
-  </p:clrMapOvr>
-  <mc:AlternateContent xmlns:mc="http://schemas.openxmlformats.org/markup-compatibility/2006" xmlns:p14="http://schemas.microsoft.com/office/powerpoint/2010/main">
-    <mc:Choice Requires="p14">
-      <p:transition p14:dur="10"/>
-    </mc:Choice>
-    <mc:Fallback xmlns="">
-      <p:transition/>
-    </mc:Fallback>
-  </mc:AlternateContent>
-  <p:timing>
-    <p:tnLst>
-      <p:par>
-        <p:cTn id="1" dur="indefinite" restart="never" nodeType="tmRoot"/>
-      </p:par>
-    </p:tnLst>
-  </p:timing>
-</p:sld>
-</file>
-
 <file path=ppt/slides/slide2.xml><?xml version="1.0" encoding="utf-8"?>
 <p:sld xmlns:a="http://schemas.openxmlformats.org/drawingml/2006/main" xmlns:r="http://schemas.openxmlformats.org/officeDocument/2006/relationships" xmlns:p="http://schemas.openxmlformats.org/presentationml/2006/main">
   <p:cSld>
@@ -11164,11 +11206,11 @@
   <p:clrMapOvr>
     <a:masterClrMapping/>
   </p:clrMapOvr>
-  <mc:AlternateContent xmlns:mc="http://schemas.openxmlformats.org/markup-compatibility/2006">
-    <mc:Choice xmlns:p14="http://schemas.microsoft.com/office/powerpoint/2010/main" Requires="p14">
+  <mc:AlternateContent xmlns:mc="http://schemas.openxmlformats.org/markup-compatibility/2006" xmlns:p14="http://schemas.microsoft.com/office/powerpoint/2010/main">
+    <mc:Choice Requires="p14">
       <p:transition p14:dur="10"/>
     </mc:Choice>
-    <mc:Fallback>
+    <mc:Fallback xmlns="">
       <p:transition/>
     </mc:Fallback>
   </mc:AlternateContent>
@@ -11975,6 +12017,301 @@
       </p:grpSpPr>
       <p:sp>
         <p:nvSpPr>
+          <p:cNvPr id="7" name="Titel 6"/>
+          <p:cNvSpPr>
+            <a:spLocks noGrp="1"/>
+          </p:cNvSpPr>
+          <p:nvPr>
+            <p:ph type="title"/>
+          </p:nvPr>
+        </p:nvSpPr>
+        <p:spPr>
+          <a:xfrm>
+            <a:off x="444503" y="347341"/>
+            <a:ext cx="6692104" cy="436017"/>
+          </a:xfrm>
+        </p:spPr>
+        <p:txBody>
+          <a:bodyPr/>
+          <a:lstStyle/>
+          <a:p>
+            <a:r>
+              <a:rPr lang="pl-PL" dirty="0" smtClean="0"/>
+              <a:t>Ćwiczenie REST Client</a:t>
+            </a:r>
+            <a:br>
+              <a:rPr lang="pl-PL" dirty="0" smtClean="0"/>
+            </a:br>
+            <a:r>
+              <a:rPr lang="pl-PL" dirty="0" smtClean="0"/>
+              <a:t>Ćwiczenia z używania REST API</a:t>
+            </a:r>
+            <a:endParaRPr lang="de-DE" dirty="0"/>
+          </a:p>
+        </p:txBody>
+      </p:sp>
+      <p:sp>
+        <p:nvSpPr>
+          <p:cNvPr id="5" name="Inhaltsplatzhalter 4"/>
+          <p:cNvSpPr>
+            <a:spLocks noGrp="1"/>
+          </p:cNvSpPr>
+          <p:nvPr>
+            <p:ph type="body" sz="quarter" idx="13"/>
+          </p:nvPr>
+        </p:nvSpPr>
+        <p:spPr/>
+        <p:txBody>
+          <a:bodyPr/>
+          <a:lstStyle/>
+          <a:p>
+            <a:r>
+              <a:rPr lang="pl-PL" dirty="0" smtClean="0"/>
+              <a:t>ĆWICZENIE 3</a:t>
+            </a:r>
+            <a:endParaRPr lang="de-DE" dirty="0"/>
+          </a:p>
+        </p:txBody>
+      </p:sp>
+      <p:sp>
+        <p:nvSpPr>
+          <p:cNvPr id="30" name="Symbol zastępczy zawartości 1"/>
+          <p:cNvSpPr>
+            <a:spLocks noGrp="1"/>
+          </p:cNvSpPr>
+          <p:nvPr>
+            <p:ph idx="1"/>
+          </p:nvPr>
+        </p:nvSpPr>
+        <p:spPr>
+          <a:xfrm>
+            <a:off x="493812" y="1482442"/>
+            <a:ext cx="7861048" cy="2525887"/>
+          </a:xfrm>
+        </p:spPr>
+        <p:txBody>
+          <a:bodyPr>
+            <a:normAutofit/>
+          </a:bodyPr>
+          <a:lstStyle/>
+          <a:p>
+            <a:r>
+              <a:rPr lang="pl-PL" dirty="0" smtClean="0"/>
+              <a:t>Zobacz co się stanie przy różnych innych zapytaniach:</a:t>
+            </a:r>
+          </a:p>
+          <a:p>
+            <a:pPr lvl="1"/>
+            <a:endParaRPr lang="pl-PL" sz="1000" dirty="0" smtClean="0"/>
+          </a:p>
+          <a:p>
+            <a:pPr lvl="2"/>
+            <a:r>
+              <a:rPr lang="pl-PL" sz="1050" dirty="0" smtClean="0"/>
+              <a:t>POST </a:t>
+            </a:r>
+            <a:r>
+              <a:rPr lang="pl-PL" sz="1050" dirty="0" smtClean="0">
+                <a:hlinkClick r:id="rId3"/>
+              </a:rPr>
+              <a:t>http://localhost:8090/products</a:t>
+            </a:r>
+            <a:r>
+              <a:rPr lang="pl-PL" sz="1050" dirty="0" smtClean="0"/>
+              <a:t>, powtórz jeszcze raz z tymi samymi danymi.</a:t>
+            </a:r>
+          </a:p>
+          <a:p>
+            <a:pPr lvl="2"/>
+            <a:r>
+              <a:rPr lang="pl-PL" sz="1050" dirty="0" smtClean="0"/>
+              <a:t>PUT </a:t>
+            </a:r>
+            <a:r>
+              <a:rPr lang="pl-PL" sz="1050" dirty="0" smtClean="0">
+                <a:hlinkClick r:id="rId4"/>
+              </a:rPr>
+              <a:t>http://localhost:8090/products/1</a:t>
+            </a:r>
+            <a:r>
+              <a:rPr lang="pl-PL" sz="1050" dirty="0" smtClean="0"/>
+              <a:t>, powtórz jeszcze raz z tymi samymi danymi.</a:t>
+            </a:r>
+          </a:p>
+          <a:p>
+            <a:pPr lvl="2"/>
+            <a:r>
+              <a:rPr lang="pl-PL" sz="1050" dirty="0" smtClean="0"/>
+              <a:t>DELETE </a:t>
+            </a:r>
+            <a:r>
+              <a:rPr lang="pl-PL" sz="1050" dirty="0">
+                <a:hlinkClick r:id="rId3"/>
+              </a:rPr>
+              <a:t>http://</a:t>
+            </a:r>
+            <a:r>
+              <a:rPr lang="pl-PL" sz="1050" dirty="0" smtClean="0">
+                <a:hlinkClick r:id="rId3"/>
+              </a:rPr>
+              <a:t>localhost:8090/products</a:t>
+            </a:r>
+            <a:endParaRPr lang="pl-PL" sz="1050" dirty="0"/>
+          </a:p>
+          <a:p>
+            <a:pPr lvl="2"/>
+            <a:r>
+              <a:rPr lang="pl-PL" sz="1050" dirty="0" smtClean="0"/>
+              <a:t>GET </a:t>
+            </a:r>
+            <a:r>
+              <a:rPr lang="pl-PL" sz="1050" dirty="0">
+                <a:hlinkClick r:id="rId5"/>
+              </a:rPr>
+              <a:t>http://</a:t>
+            </a:r>
+            <a:r>
+              <a:rPr lang="pl-PL" sz="1050" dirty="0" smtClean="0">
+                <a:hlinkClick r:id="rId5"/>
+              </a:rPr>
+              <a:t>localhost:8090/foo</a:t>
+            </a:r>
+            <a:endParaRPr lang="pl-PL" sz="1050" dirty="0" smtClean="0"/>
+          </a:p>
+          <a:p>
+            <a:pPr lvl="2"/>
+            <a:r>
+              <a:rPr lang="pl-PL" sz="1050" dirty="0" smtClean="0"/>
+              <a:t>PUT </a:t>
+            </a:r>
+            <a:r>
+              <a:rPr lang="pl-PL" sz="1050" dirty="0" smtClean="0">
+                <a:hlinkClick r:id="rId6"/>
+              </a:rPr>
+              <a:t>http://localhost:8090/products/2</a:t>
+            </a:r>
+            <a:r>
+              <a:rPr lang="pl-PL" sz="1050" dirty="0" smtClean="0"/>
+              <a:t> (Content-</a:t>
+            </a:r>
+            <a:r>
+              <a:rPr lang="pl-PL" sz="1050" dirty="0" err="1" smtClean="0"/>
+              <a:t>Type</a:t>
+            </a:r>
+            <a:r>
+              <a:rPr lang="pl-PL" sz="1050" dirty="0" smtClean="0"/>
+              <a:t>=</a:t>
+            </a:r>
+            <a:r>
+              <a:rPr lang="pl-PL" sz="1050" dirty="0" err="1" smtClean="0"/>
+              <a:t>application</a:t>
+            </a:r>
+            <a:r>
+              <a:rPr lang="pl-PL" sz="1050" dirty="0" smtClean="0"/>
+              <a:t>/</a:t>
+            </a:r>
+            <a:r>
+              <a:rPr lang="pl-PL" sz="1050" dirty="0" err="1" smtClean="0"/>
+              <a:t>xml</a:t>
+            </a:r>
+            <a:r>
+              <a:rPr lang="pl-PL" sz="1050" dirty="0" smtClean="0"/>
+              <a:t>)</a:t>
+            </a:r>
+          </a:p>
+          <a:p>
+            <a:pPr lvl="2"/>
+            <a:r>
+              <a:rPr lang="pl-PL" sz="1050" dirty="0"/>
+              <a:t>DELETE </a:t>
+            </a:r>
+            <a:r>
+              <a:rPr lang="pl-PL" sz="1050" dirty="0">
+                <a:hlinkClick r:id="rId4"/>
+              </a:rPr>
+              <a:t>http://</a:t>
+            </a:r>
+            <a:r>
+              <a:rPr lang="pl-PL" sz="1050" dirty="0" smtClean="0">
+                <a:hlinkClick r:id="rId4"/>
+              </a:rPr>
+              <a:t>localhost:8090/products/1</a:t>
+            </a:r>
+            <a:r>
+              <a:rPr lang="pl-PL" sz="1050" dirty="0" smtClean="0"/>
+              <a:t>, powtórzone </a:t>
+            </a:r>
+            <a:r>
+              <a:rPr lang="pl-PL" sz="1050" dirty="0"/>
+              <a:t>DELETE </a:t>
+            </a:r>
+            <a:r>
+              <a:rPr lang="pl-PL" sz="1050" dirty="0">
+                <a:hlinkClick r:id="rId3"/>
+              </a:rPr>
+              <a:t>http://</a:t>
+            </a:r>
+            <a:r>
+              <a:rPr lang="pl-PL" sz="1050" dirty="0" smtClean="0">
+                <a:hlinkClick r:id="rId3"/>
+              </a:rPr>
+              <a:t>localhost:8090/products</a:t>
+            </a:r>
+            <a:r>
+              <a:rPr lang="pl-PL" sz="1050" dirty="0" smtClean="0"/>
+              <a:t>/1</a:t>
+            </a:r>
+            <a:endParaRPr lang="pl-PL" sz="1050" dirty="0"/>
+          </a:p>
+        </p:txBody>
+      </p:sp>
+    </p:spTree>
+    <p:extLst>
+      <p:ext uri="{BB962C8B-B14F-4D97-AF65-F5344CB8AC3E}">
+        <p14:creationId xmlns:p14="http://schemas.microsoft.com/office/powerpoint/2010/main" val="1765496199"/>
+      </p:ext>
+    </p:extLst>
+  </p:cSld>
+  <p:clrMapOvr>
+    <a:masterClrMapping/>
+  </p:clrMapOvr>
+  <mc:AlternateContent xmlns:mc="http://schemas.openxmlformats.org/markup-compatibility/2006" xmlns:p14="http://schemas.microsoft.com/office/powerpoint/2010/main">
+    <mc:Choice Requires="p14">
+      <p:transition p14:dur="10"/>
+    </mc:Choice>
+    <mc:Fallback xmlns="">
+      <p:transition/>
+    </mc:Fallback>
+  </mc:AlternateContent>
+  <p:timing>
+    <p:tnLst>
+      <p:par>
+        <p:cTn id="1" dur="indefinite" restart="never" nodeType="tmRoot"/>
+      </p:par>
+    </p:tnLst>
+  </p:timing>
+</p:sld>
+</file>
+
+<file path=ppt/slides/slide21.xml><?xml version="1.0" encoding="utf-8"?>
+<p:sld xmlns:a="http://schemas.openxmlformats.org/drawingml/2006/main" xmlns:r="http://schemas.openxmlformats.org/officeDocument/2006/relationships" xmlns:p="http://schemas.openxmlformats.org/presentationml/2006/main">
+  <p:cSld>
+    <p:spTree>
+      <p:nvGrpSpPr>
+        <p:cNvPr id="1" name=""/>
+        <p:cNvGrpSpPr/>
+        <p:nvPr/>
+      </p:nvGrpSpPr>
+      <p:grpSpPr>
+        <a:xfrm>
+          <a:off x="0" y="0"/>
+          <a:ext cx="0" cy="0"/>
+          <a:chOff x="0" y="0"/>
+          <a:chExt cx="0" cy="0"/>
+        </a:xfrm>
+      </p:grpSpPr>
+      <p:sp>
+        <p:nvSpPr>
           <p:cNvPr id="12" name="Prostokąt zaokrąglony 11"/>
           <p:cNvSpPr/>
           <p:nvPr/>
@@ -12482,411 +12819,6 @@
 </p:sld>
 </file>
 
-<file path=ppt/slides/slide21.xml><?xml version="1.0" encoding="utf-8"?>
-<p:sld xmlns:a="http://schemas.openxmlformats.org/drawingml/2006/main" xmlns:r="http://schemas.openxmlformats.org/officeDocument/2006/relationships" xmlns:p="http://schemas.openxmlformats.org/presentationml/2006/main">
-  <p:cSld>
-    <p:spTree>
-      <p:nvGrpSpPr>
-        <p:cNvPr id="1" name=""/>
-        <p:cNvGrpSpPr/>
-        <p:nvPr/>
-      </p:nvGrpSpPr>
-      <p:grpSpPr>
-        <a:xfrm>
-          <a:off x="0" y="0"/>
-          <a:ext cx="0" cy="0"/>
-          <a:chOff x="0" y="0"/>
-          <a:chExt cx="0" cy="0"/>
-        </a:xfrm>
-      </p:grpSpPr>
-      <p:sp>
-        <p:nvSpPr>
-          <p:cNvPr id="7" name="Titel 6"/>
-          <p:cNvSpPr>
-            <a:spLocks noGrp="1"/>
-          </p:cNvSpPr>
-          <p:nvPr>
-            <p:ph type="title"/>
-          </p:nvPr>
-        </p:nvSpPr>
-        <p:spPr/>
-        <p:txBody>
-          <a:bodyPr/>
-          <a:lstStyle/>
-          <a:p>
-            <a:r>
-              <a:rPr lang="pl-PL" dirty="0"/>
-              <a:t>Ćwiczenie REST Client</a:t>
-            </a:r>
-            <a:endParaRPr lang="de-DE" dirty="0"/>
-          </a:p>
-        </p:txBody>
-      </p:sp>
-      <p:sp>
-        <p:nvSpPr>
-          <p:cNvPr id="5" name="Inhaltsplatzhalter 4"/>
-          <p:cNvSpPr>
-            <a:spLocks noGrp="1"/>
-          </p:cNvSpPr>
-          <p:nvPr>
-            <p:ph type="body" sz="quarter" idx="13"/>
-          </p:nvPr>
-        </p:nvSpPr>
-        <p:spPr/>
-        <p:txBody>
-          <a:bodyPr/>
-          <a:lstStyle/>
-          <a:p>
-            <a:r>
-              <a:rPr lang="pl-PL" dirty="0" smtClean="0"/>
-              <a:t>ĆWICZENIE 3</a:t>
-            </a:r>
-            <a:endParaRPr lang="de-DE" dirty="0"/>
-          </a:p>
-        </p:txBody>
-      </p:sp>
-      <p:sp>
-        <p:nvSpPr>
-          <p:cNvPr id="4" name="Symbol zastępczy zawartości 1"/>
-          <p:cNvSpPr>
-            <a:spLocks noGrp="1"/>
-          </p:cNvSpPr>
-          <p:nvPr>
-            <p:ph idx="1"/>
-          </p:nvPr>
-        </p:nvSpPr>
-        <p:spPr>
-          <a:xfrm>
-            <a:off x="443708" y="1119187"/>
-            <a:ext cx="7986308" cy="3362325"/>
-          </a:xfrm>
-        </p:spPr>
-        <p:txBody>
-          <a:bodyPr>
-            <a:normAutofit lnSpcReduction="10000"/>
-          </a:bodyPr>
-          <a:lstStyle/>
-          <a:p>
-            <a:r>
-              <a:rPr lang="pl-PL" dirty="0" smtClean="0"/>
-              <a:t>Zadanie: </a:t>
-            </a:r>
-            <a:r>
-              <a:rPr lang="pl-PL" dirty="0" smtClean="0"/>
-              <a:t>zaimplementuj wywołania serwera web service’ów (czyli stronę kliencką)</a:t>
-            </a:r>
-          </a:p>
-          <a:p>
-            <a:pPr lvl="1"/>
-            <a:r>
-              <a:rPr lang="pl-PL" smtClean="0"/>
-              <a:t>Część serwerowa i szkielet strony klienckiej jest już zaimplementowany.</a:t>
-            </a:r>
-            <a:endParaRPr lang="pl-PL" dirty="0" smtClean="0"/>
-          </a:p>
-          <a:p>
-            <a:pPr lvl="1"/>
-            <a:r>
-              <a:rPr lang="pl-PL" dirty="0"/>
-              <a:t>Z</a:t>
-            </a:r>
-            <a:r>
-              <a:rPr lang="pl-PL" dirty="0" smtClean="0"/>
-              <a:t>modyfikuj </a:t>
-            </a:r>
-            <a:r>
-              <a:rPr lang="pl-PL" dirty="0" smtClean="0"/>
-              <a:t>klasę wdsr.exercise3.client.ProductService</a:t>
-            </a:r>
-          </a:p>
-          <a:p>
-            <a:pPr lvl="1"/>
-            <a:r>
-              <a:rPr lang="pl-PL" dirty="0" smtClean="0"/>
-              <a:t>Zaimplementuj metody w tej klasie tak, aby działały zgodnie z dokumentacją </a:t>
-            </a:r>
-            <a:r>
-              <a:rPr lang="pl-PL" dirty="0" err="1" smtClean="0"/>
-              <a:t>javadoc</a:t>
-            </a:r>
-            <a:r>
-              <a:rPr lang="pl-PL" dirty="0" smtClean="0"/>
-              <a:t>.</a:t>
-            </a:r>
-          </a:p>
-          <a:p>
-            <a:pPr lvl="2"/>
-            <a:r>
-              <a:rPr lang="pl-PL" dirty="0" smtClean="0"/>
-              <a:t>Serwer używany w testach nasłuchuje pod adresem </a:t>
-            </a:r>
-            <a:r>
-              <a:rPr lang="pl-PL" dirty="0" smtClean="0">
-                <a:hlinkClick r:id="rId3"/>
-              </a:rPr>
-              <a:t>http://localhost:8091</a:t>
-            </a:r>
-            <a:endParaRPr lang="pl-PL" dirty="0" smtClean="0"/>
-          </a:p>
-          <a:p>
-            <a:pPr lvl="3"/>
-            <a:r>
-              <a:rPr lang="pl-PL" dirty="0" smtClean="0"/>
-              <a:t>W razie konfliktu portów (</a:t>
-            </a:r>
-            <a:r>
-              <a:rPr lang="en-US" sz="800" dirty="0"/>
-              <a:t>Address already in use: bind</a:t>
-            </a:r>
-            <a:r>
-              <a:rPr lang="pl-PL" dirty="0" smtClean="0"/>
-              <a:t>) zmień numer portu w klasie </a:t>
-            </a:r>
-            <a:r>
-              <a:rPr lang="pl-PL" dirty="0" err="1" smtClean="0"/>
-              <a:t>ClientTestBase</a:t>
-            </a:r>
-            <a:r>
-              <a:rPr lang="pl-PL" dirty="0" smtClean="0"/>
-              <a:t>.</a:t>
-            </a:r>
-          </a:p>
-          <a:p>
-            <a:pPr lvl="1"/>
-            <a:r>
-              <a:rPr lang="pl-PL" dirty="0" smtClean="0"/>
-              <a:t>Klasa wdsr.exercise3.client.StatusChecker może posłużyć jako przykład.</a:t>
-            </a:r>
-          </a:p>
-          <a:p>
-            <a:pPr lvl="2"/>
-            <a:r>
-              <a:rPr lang="pl-PL" dirty="0" err="1" smtClean="0"/>
-              <a:t>StatusChecker</a:t>
-            </a:r>
-            <a:r>
-              <a:rPr lang="pl-PL" dirty="0" smtClean="0"/>
-              <a:t>::</a:t>
-            </a:r>
-            <a:r>
-              <a:rPr lang="pl-PL" dirty="0" err="1" smtClean="0"/>
-              <a:t>isServerOk</a:t>
-            </a:r>
-            <a:r>
-              <a:rPr lang="pl-PL" dirty="0" smtClean="0"/>
-              <a:t> wysyła żądanie GET na adres </a:t>
-            </a:r>
-            <a:r>
-              <a:rPr lang="pl-PL" dirty="0" smtClean="0">
-                <a:hlinkClick r:id="rId4"/>
-              </a:rPr>
-              <a:t>http://localhost:8091/status</a:t>
-            </a:r>
-            <a:r>
-              <a:rPr lang="pl-PL" dirty="0" smtClean="0"/>
-              <a:t> i zwraca </a:t>
-            </a:r>
-            <a:r>
-              <a:rPr lang="pl-PL" dirty="0" err="1" smtClean="0"/>
-              <a:t>true</a:t>
-            </a:r>
-            <a:r>
-              <a:rPr lang="pl-PL" dirty="0" smtClean="0"/>
-              <a:t> jeśli odpowiedź ma status 200 OK i treść OK, </a:t>
-            </a:r>
-            <a:r>
-              <a:rPr lang="pl-PL" dirty="0" err="1" smtClean="0"/>
-              <a:t>false</a:t>
-            </a:r>
-            <a:r>
-              <a:rPr lang="pl-PL" dirty="0" smtClean="0"/>
-              <a:t> w przeciwnym wypadku.</a:t>
-            </a:r>
-            <a:endParaRPr lang="pl-PL" dirty="0"/>
-          </a:p>
-          <a:p>
-            <a:endParaRPr lang="pl-PL" dirty="0" smtClean="0"/>
-          </a:p>
-          <a:p>
-            <a:r>
-              <a:rPr lang="pl-PL" dirty="0" smtClean="0"/>
-              <a:t>Zasoby:</a:t>
-            </a:r>
-          </a:p>
-          <a:p>
-            <a:pPr lvl="1"/>
-            <a:r>
-              <a:rPr lang="pl-PL" dirty="0" smtClean="0"/>
-              <a:t>JAX-RS 2.0 </a:t>
-            </a:r>
-            <a:r>
-              <a:rPr lang="pl-PL" dirty="0" err="1" smtClean="0"/>
-              <a:t>JavaDoc</a:t>
-            </a:r>
-            <a:r>
-              <a:rPr lang="pl-PL" dirty="0" smtClean="0"/>
-              <a:t>: </a:t>
-            </a:r>
-            <a:r>
-              <a:rPr lang="pl-PL" dirty="0" smtClean="0">
-                <a:hlinkClick r:id="rId5"/>
-              </a:rPr>
-              <a:t>https</a:t>
-            </a:r>
-            <a:r>
-              <a:rPr lang="pl-PL" dirty="0">
-                <a:hlinkClick r:id="rId5"/>
-              </a:rPr>
-              <a:t>://</a:t>
-            </a:r>
-            <a:r>
-              <a:rPr lang="pl-PL" dirty="0" smtClean="0">
-                <a:hlinkClick r:id="rId5"/>
-              </a:rPr>
-              <a:t>jax-rs-spec.java.net/nonav/2.0-rev-a/apidocs/index.html</a:t>
-            </a:r>
-            <a:endParaRPr lang="pl-PL" dirty="0" smtClean="0"/>
-          </a:p>
-          <a:p>
-            <a:pPr lvl="1"/>
-            <a:r>
-              <a:rPr lang="pl-PL" dirty="0" err="1" smtClean="0"/>
-              <a:t>Building</a:t>
-            </a:r>
-            <a:r>
-              <a:rPr lang="pl-PL" dirty="0" smtClean="0"/>
-              <a:t> </a:t>
-            </a:r>
-            <a:r>
-              <a:rPr lang="pl-PL" dirty="0" err="1" smtClean="0"/>
-              <a:t>RESTful</a:t>
-            </a:r>
-            <a:r>
-              <a:rPr lang="pl-PL" dirty="0" smtClean="0"/>
-              <a:t> Web Services </a:t>
-            </a:r>
-            <a:r>
-              <a:rPr lang="pl-PL" dirty="0"/>
-              <a:t>with JAX-RS: </a:t>
-            </a:r>
-            <a:r>
-              <a:rPr lang="pl-PL" dirty="0">
-                <a:hlinkClick r:id="rId6"/>
-              </a:rPr>
-              <a:t>http://</a:t>
-            </a:r>
-            <a:r>
-              <a:rPr lang="pl-PL" dirty="0" smtClean="0">
-                <a:hlinkClick r:id="rId6"/>
-              </a:rPr>
-              <a:t>docs.oracle.com/javaee/6/tutorial/doc/giepu.html</a:t>
-            </a:r>
-            <a:endParaRPr lang="pl-PL" dirty="0" smtClean="0"/>
-          </a:p>
-          <a:p>
-            <a:pPr lvl="1"/>
-            <a:r>
-              <a:rPr lang="pl-PL" dirty="0" smtClean="0"/>
-              <a:t>The </a:t>
-            </a:r>
-            <a:r>
-              <a:rPr lang="pl-PL" dirty="0" err="1" smtClean="0"/>
-              <a:t>Executable</a:t>
-            </a:r>
-            <a:r>
-              <a:rPr lang="pl-PL" dirty="0" smtClean="0"/>
-              <a:t> </a:t>
-            </a:r>
-            <a:r>
-              <a:rPr lang="pl-PL" dirty="0" err="1" smtClean="0"/>
-              <a:t>Feel</a:t>
-            </a:r>
-            <a:r>
-              <a:rPr lang="pl-PL" dirty="0" smtClean="0"/>
-              <a:t> of JAX-RS 2.0 Client: </a:t>
-            </a:r>
-            <a:r>
-              <a:rPr lang="pl-PL" dirty="0" smtClean="0">
-                <a:hlinkClick r:id="rId7"/>
-              </a:rPr>
-              <a:t>http</a:t>
-            </a:r>
-            <a:r>
-              <a:rPr lang="pl-PL" dirty="0">
-                <a:hlinkClick r:id="rId7"/>
-              </a:rPr>
-              <a:t>://</a:t>
-            </a:r>
-            <a:r>
-              <a:rPr lang="pl-PL" dirty="0" smtClean="0">
-                <a:hlinkClick r:id="rId7"/>
-              </a:rPr>
-              <a:t>www.adam-bien.com/roller/abien/entry/the_executable_feel_of_jax</a:t>
-            </a:r>
-            <a:endParaRPr lang="pl-PL" dirty="0" smtClean="0"/>
-          </a:p>
-          <a:p>
-            <a:pPr lvl="1"/>
-            <a:r>
-              <a:rPr lang="pl-PL" dirty="0" err="1" smtClean="0"/>
-              <a:t>Paddy’s</a:t>
-            </a:r>
-            <a:r>
-              <a:rPr lang="pl-PL" dirty="0" smtClean="0"/>
-              <a:t> </a:t>
-            </a:r>
-            <a:r>
-              <a:rPr lang="pl-PL" dirty="0" err="1" smtClean="0"/>
-              <a:t>Weblog</a:t>
-            </a:r>
-            <a:r>
-              <a:rPr lang="pl-PL" dirty="0"/>
-              <a:t>: </a:t>
-            </a:r>
-            <a:r>
-              <a:rPr lang="pl-PL" dirty="0">
-                <a:hlinkClick r:id="rId8"/>
-              </a:rPr>
-              <a:t>http://</a:t>
-            </a:r>
-            <a:r>
-              <a:rPr lang="pl-PL" dirty="0" smtClean="0">
-                <a:hlinkClick r:id="rId8"/>
-              </a:rPr>
-              <a:t>paddyweblog.blogspot.com/2012/05/restful-client-in-java-with-jax-rs-20.html</a:t>
-            </a:r>
-            <a:endParaRPr lang="pl-PL" dirty="0" smtClean="0"/>
-          </a:p>
-        </p:txBody>
-      </p:sp>
-    </p:spTree>
-    <p:extLst>
-      <p:ext uri="{BB962C8B-B14F-4D97-AF65-F5344CB8AC3E}">
-        <p14:creationId xmlns:p14="http://schemas.microsoft.com/office/powerpoint/2010/main" val="1336546276"/>
-      </p:ext>
-    </p:extLst>
-  </p:cSld>
-  <p:clrMapOvr>
-    <a:masterClrMapping/>
-  </p:clrMapOvr>
-  <mc:AlternateContent xmlns:mc="http://schemas.openxmlformats.org/markup-compatibility/2006" xmlns:p14="http://schemas.microsoft.com/office/powerpoint/2010/main">
-    <mc:Choice Requires="p14">
-      <p:transition p14:dur="10"/>
-    </mc:Choice>
-    <mc:Fallback xmlns="">
-      <p:transition/>
-    </mc:Fallback>
-  </mc:AlternateContent>
-  <p:timing>
-    <p:tnLst>
-      <p:par>
-        <p:cTn id="1" dur="indefinite" restart="never" nodeType="tmRoot"/>
-      </p:par>
-    </p:tnLst>
-  </p:timing>
-</p:sld>
-</file>
-
 <file path=ppt/slides/slide22.xml><?xml version="1.0" encoding="utf-8"?>
 <p:sld xmlns:a="http://schemas.openxmlformats.org/drawingml/2006/main" xmlns:r="http://schemas.openxmlformats.org/officeDocument/2006/relationships" xmlns:p="http://schemas.openxmlformats.org/presentationml/2006/main">
   <p:cSld>
@@ -12920,8 +12852,8 @@
           <a:lstStyle/>
           <a:p>
             <a:r>
-              <a:rPr lang="pl-PL" dirty="0" smtClean="0"/>
-              <a:t>Ćwiczenie REST Server</a:t>
+              <a:rPr lang="pl-PL" dirty="0"/>
+              <a:t>Ćwiczenie REST Client</a:t>
             </a:r>
             <a:endParaRPr lang="de-DE" dirty="0"/>
           </a:p>
@@ -12952,72 +12884,314 @@
       </p:sp>
       <p:sp>
         <p:nvSpPr>
-          <p:cNvPr id="3" name="Prostokąt zaokrąglony 2"/>
-          <p:cNvSpPr/>
-          <p:nvPr/>
+          <p:cNvPr id="4" name="Symbol zastępczy zawartości 1"/>
+          <p:cNvSpPr>
+            <a:spLocks noGrp="1"/>
+          </p:cNvSpPr>
+          <p:nvPr>
+            <p:ph idx="1"/>
+          </p:nvPr>
         </p:nvSpPr>
         <p:spPr>
           <a:xfrm>
-            <a:off x="1609595" y="1546963"/>
-            <a:ext cx="5730657" cy="1991639"/>
+            <a:off x="443708" y="1119187"/>
+            <a:ext cx="7986308" cy="3362325"/>
           </a:xfrm>
-          <a:prstGeom prst="roundRect">
-            <a:avLst/>
-          </a:prstGeom>
-          <a:ln/>
         </p:spPr>
-        <p:style>
-          <a:lnRef idx="2">
-            <a:schemeClr val="accent3">
-              <a:shade val="50000"/>
-            </a:schemeClr>
-          </a:lnRef>
-          <a:fillRef idx="1">
-            <a:schemeClr val="accent3"/>
-          </a:fillRef>
-          <a:effectRef idx="0">
-            <a:schemeClr val="accent3"/>
-          </a:effectRef>
-          <a:fontRef idx="minor">
-            <a:schemeClr val="lt1"/>
-          </a:fontRef>
-        </p:style>
-        <p:txBody>
-          <a:bodyPr lIns="108000" tIns="108000" rIns="108000" bIns="108000" rtlCol="0" anchor="ctr"/>
+        <p:txBody>
+          <a:bodyPr>
+            <a:normAutofit lnSpcReduction="10000"/>
+          </a:bodyPr>
           <a:lstStyle/>
           <a:p>
-            <a:pPr algn="ctr"/>
-            <a:r>
-              <a:rPr lang="pl-PL" sz="1600" dirty="0" smtClean="0">
-                <a:solidFill>
-                  <a:schemeClr val="tx1"/>
-                </a:solidFill>
+            <a:r>
+              <a:rPr lang="pl-PL" dirty="0" smtClean="0"/>
+              <a:t>Zadanie: zaimplementuj wywołania serwera web service’ów (czyli stronę kliencką)</a:t>
+            </a:r>
+          </a:p>
+          <a:p>
+            <a:pPr lvl="1"/>
+            <a:r>
+              <a:rPr lang="pl-PL" smtClean="0"/>
+              <a:t>Część serwerowa i szkielet strony klienckiej jest już zaimplementowany.</a:t>
+            </a:r>
+            <a:endParaRPr lang="pl-PL" dirty="0" smtClean="0"/>
+          </a:p>
+          <a:p>
+            <a:pPr lvl="1"/>
+            <a:r>
+              <a:rPr lang="pl-PL" dirty="0"/>
+              <a:t>Z</a:t>
+            </a:r>
+            <a:r>
+              <a:rPr lang="pl-PL" dirty="0" smtClean="0"/>
+              <a:t>modyfikuj klasę wdsr.exercise3.client.ProductService</a:t>
+            </a:r>
+          </a:p>
+          <a:p>
+            <a:pPr lvl="1"/>
+            <a:r>
+              <a:rPr lang="pl-PL" dirty="0" smtClean="0"/>
+              <a:t>Zaimplementuj metody w tej klasie tak, aby działały zgodnie z dokumentacją </a:t>
+            </a:r>
+            <a:r>
+              <a:rPr lang="pl-PL" dirty="0" err="1" smtClean="0"/>
+              <a:t>javadoc</a:t>
+            </a:r>
+            <a:r>
+              <a:rPr lang="pl-PL" dirty="0" smtClean="0"/>
+              <a:t>.</a:t>
+            </a:r>
+          </a:p>
+          <a:p>
+            <a:pPr lvl="2"/>
+            <a:r>
+              <a:rPr lang="pl-PL" dirty="0" smtClean="0"/>
+              <a:t>Serwer używany w testach nasłuchuje pod adresem </a:t>
+            </a:r>
+            <a:r>
+              <a:rPr lang="pl-PL" dirty="0" smtClean="0">
+                <a:hlinkClick r:id="rId3"/>
               </a:rPr>
-              <a:t>Ćwiczenie 3</a:t>
-            </a:r>
-          </a:p>
-          <a:p>
-            <a:pPr algn="ctr"/>
-            <a:r>
-              <a:rPr lang="pl-PL" sz="1600" dirty="0" smtClean="0"/>
-              <a:t>REST - </a:t>
-            </a:r>
-            <a:r>
-              <a:rPr lang="pl-PL" sz="1600" dirty="0" err="1" smtClean="0"/>
-              <a:t>server</a:t>
-            </a:r>
-            <a:endParaRPr lang="pl-PL" sz="1600" dirty="0" smtClean="0">
-              <a:solidFill>
-                <a:schemeClr val="tx1"/>
-              </a:solidFill>
-            </a:endParaRPr>
+              <a:t>http://localhost:8091</a:t>
+            </a:r>
+            <a:endParaRPr lang="pl-PL" dirty="0" smtClean="0"/>
+          </a:p>
+          <a:p>
+            <a:pPr lvl="3"/>
+            <a:r>
+              <a:rPr lang="pl-PL" dirty="0" smtClean="0"/>
+              <a:t>W razie konfliktu portów (</a:t>
+            </a:r>
+            <a:r>
+              <a:rPr lang="en-US" sz="800" dirty="0"/>
+              <a:t>Address already in use: bind</a:t>
+            </a:r>
+            <a:r>
+              <a:rPr lang="pl-PL" dirty="0" smtClean="0"/>
+              <a:t>) zmień numer portu w klasie </a:t>
+            </a:r>
+            <a:r>
+              <a:rPr lang="pl-PL" dirty="0" err="1" smtClean="0"/>
+              <a:t>ClientTestBase</a:t>
+            </a:r>
+            <a:r>
+              <a:rPr lang="pl-PL" dirty="0" smtClean="0"/>
+              <a:t>.</a:t>
+            </a:r>
+          </a:p>
+          <a:p>
+            <a:pPr lvl="1"/>
+            <a:r>
+              <a:rPr lang="pl-PL" dirty="0" smtClean="0"/>
+              <a:t>Klasa wdsr.exercise3.client.StatusChecker może posłużyć jako przykład.</a:t>
+            </a:r>
+          </a:p>
+          <a:p>
+            <a:pPr lvl="2"/>
+            <a:r>
+              <a:rPr lang="pl-PL" dirty="0" err="1" smtClean="0"/>
+              <a:t>StatusChecker</a:t>
+            </a:r>
+            <a:r>
+              <a:rPr lang="pl-PL" dirty="0" smtClean="0"/>
+              <a:t>::</a:t>
+            </a:r>
+            <a:r>
+              <a:rPr lang="pl-PL" dirty="0" err="1" smtClean="0"/>
+              <a:t>isServerOk</a:t>
+            </a:r>
+            <a:r>
+              <a:rPr lang="pl-PL" dirty="0" smtClean="0"/>
+              <a:t> wysyła żądanie GET na adres </a:t>
+            </a:r>
+            <a:r>
+              <a:rPr lang="pl-PL" dirty="0" smtClean="0">
+                <a:hlinkClick r:id="rId4"/>
+              </a:rPr>
+              <a:t>http://localhost:8091/status</a:t>
+            </a:r>
+            <a:r>
+              <a:rPr lang="pl-PL" dirty="0" smtClean="0"/>
+              <a:t> i zwraca </a:t>
+            </a:r>
+            <a:r>
+              <a:rPr lang="pl-PL" dirty="0" err="1" smtClean="0"/>
+              <a:t>true</a:t>
+            </a:r>
+            <a:r>
+              <a:rPr lang="pl-PL" dirty="0" smtClean="0"/>
+              <a:t> jeśli odpowiedź ma status 200 OK i treść OK, </a:t>
+            </a:r>
+            <a:r>
+              <a:rPr lang="pl-PL" dirty="0" err="1" smtClean="0"/>
+              <a:t>false</a:t>
+            </a:r>
+            <a:r>
+              <a:rPr lang="pl-PL" dirty="0" smtClean="0"/>
+              <a:t> w przeciwnym wypadku.</a:t>
+            </a:r>
+            <a:endParaRPr lang="pl-PL" dirty="0"/>
+          </a:p>
+          <a:p>
+            <a:endParaRPr lang="pl-PL" dirty="0" smtClean="0"/>
+          </a:p>
+          <a:p>
+            <a:r>
+              <a:rPr lang="pl-PL" dirty="0" smtClean="0"/>
+              <a:t>Zasoby:</a:t>
+            </a:r>
+          </a:p>
+          <a:p>
+            <a:pPr lvl="1"/>
+            <a:r>
+              <a:rPr lang="pl-PL" dirty="0" smtClean="0"/>
+              <a:t>JAX-RS 2.0 </a:t>
+            </a:r>
+            <a:r>
+              <a:rPr lang="pl-PL" dirty="0" err="1" smtClean="0"/>
+              <a:t>JavaDoc</a:t>
+            </a:r>
+            <a:r>
+              <a:rPr lang="pl-PL" dirty="0" smtClean="0"/>
+              <a:t>: </a:t>
+            </a:r>
+            <a:r>
+              <a:rPr lang="pl-PL" dirty="0" smtClean="0">
+                <a:hlinkClick r:id="rId5"/>
+              </a:rPr>
+              <a:t>https</a:t>
+            </a:r>
+            <a:r>
+              <a:rPr lang="pl-PL" dirty="0">
+                <a:hlinkClick r:id="rId5"/>
+              </a:rPr>
+              <a:t>://</a:t>
+            </a:r>
+            <a:r>
+              <a:rPr lang="pl-PL" dirty="0" smtClean="0">
+                <a:hlinkClick r:id="rId5"/>
+              </a:rPr>
+              <a:t>jax-rs-spec.java.net/nonav/2.0-rev-a/apidocs/index.html</a:t>
+            </a:r>
+            <a:endParaRPr lang="pl-PL" dirty="0" smtClean="0"/>
+          </a:p>
+          <a:p>
+            <a:pPr lvl="1"/>
+            <a:r>
+              <a:rPr lang="pl-PL" dirty="0" err="1" smtClean="0"/>
+              <a:t>Building</a:t>
+            </a:r>
+            <a:r>
+              <a:rPr lang="pl-PL" dirty="0" smtClean="0"/>
+              <a:t> </a:t>
+            </a:r>
+            <a:r>
+              <a:rPr lang="pl-PL" dirty="0" err="1" smtClean="0"/>
+              <a:t>RESTful</a:t>
+            </a:r>
+            <a:r>
+              <a:rPr lang="pl-PL" dirty="0" smtClean="0"/>
+              <a:t> Web Services </a:t>
+            </a:r>
+            <a:r>
+              <a:rPr lang="pl-PL" dirty="0"/>
+              <a:t>with JAX-RS: </a:t>
+            </a:r>
+            <a:r>
+              <a:rPr lang="pl-PL" dirty="0">
+                <a:hlinkClick r:id="rId6"/>
+              </a:rPr>
+              <a:t>http://</a:t>
+            </a:r>
+            <a:r>
+              <a:rPr lang="pl-PL" dirty="0" smtClean="0">
+                <a:hlinkClick r:id="rId6"/>
+              </a:rPr>
+              <a:t>docs.oracle.com/javaee/6/tutorial/doc/giepu.html</a:t>
+            </a:r>
+            <a:endParaRPr lang="pl-PL" dirty="0" smtClean="0"/>
+          </a:p>
+          <a:p>
+            <a:pPr lvl="1"/>
+            <a:r>
+              <a:rPr lang="pl-PL" dirty="0" smtClean="0"/>
+              <a:t>The </a:t>
+            </a:r>
+            <a:r>
+              <a:rPr lang="pl-PL" dirty="0" err="1" smtClean="0"/>
+              <a:t>Executable</a:t>
+            </a:r>
+            <a:r>
+              <a:rPr lang="pl-PL" dirty="0" smtClean="0"/>
+              <a:t> </a:t>
+            </a:r>
+            <a:r>
+              <a:rPr lang="pl-PL" dirty="0" err="1" smtClean="0"/>
+              <a:t>Feel</a:t>
+            </a:r>
+            <a:r>
+              <a:rPr lang="pl-PL" dirty="0" smtClean="0"/>
+              <a:t> of JAX-RS 2.0 Client: </a:t>
+            </a:r>
+            <a:r>
+              <a:rPr lang="pl-PL" dirty="0" smtClean="0">
+                <a:hlinkClick r:id="rId7"/>
+              </a:rPr>
+              <a:t>http</a:t>
+            </a:r>
+            <a:r>
+              <a:rPr lang="pl-PL" dirty="0">
+                <a:hlinkClick r:id="rId7"/>
+              </a:rPr>
+              <a:t>://</a:t>
+            </a:r>
+            <a:r>
+              <a:rPr lang="pl-PL" dirty="0" smtClean="0">
+                <a:hlinkClick r:id="rId7"/>
+              </a:rPr>
+              <a:t>www.adam-bien.com/roller/abien/entry/the_executable_feel_of_jax</a:t>
+            </a:r>
+            <a:endParaRPr lang="pl-PL" dirty="0" smtClean="0"/>
+          </a:p>
+          <a:p>
+            <a:pPr lvl="1"/>
+            <a:r>
+              <a:rPr lang="pl-PL" dirty="0" err="1" smtClean="0"/>
+              <a:t>Paddy’s</a:t>
+            </a:r>
+            <a:r>
+              <a:rPr lang="pl-PL" dirty="0" smtClean="0"/>
+              <a:t> </a:t>
+            </a:r>
+            <a:r>
+              <a:rPr lang="pl-PL" dirty="0" err="1" smtClean="0"/>
+              <a:t>Weblog</a:t>
+            </a:r>
+            <a:r>
+              <a:rPr lang="pl-PL" dirty="0"/>
+              <a:t>: </a:t>
+            </a:r>
+            <a:r>
+              <a:rPr lang="pl-PL" dirty="0">
+                <a:hlinkClick r:id="rId8"/>
+              </a:rPr>
+              <a:t>http://</a:t>
+            </a:r>
+            <a:r>
+              <a:rPr lang="pl-PL" dirty="0" smtClean="0">
+                <a:hlinkClick r:id="rId8"/>
+              </a:rPr>
+              <a:t>paddyweblog.blogspot.com/2012/05/restful-client-in-java-with-jax-rs-20.html</a:t>
+            </a:r>
+            <a:endParaRPr lang="pl-PL" dirty="0" smtClean="0"/>
           </a:p>
         </p:txBody>
       </p:sp>
     </p:spTree>
     <p:extLst>
       <p:ext uri="{BB962C8B-B14F-4D97-AF65-F5344CB8AC3E}">
-        <p14:creationId xmlns:p14="http://schemas.microsoft.com/office/powerpoint/2010/main" val="2042540814"/>
+        <p14:creationId xmlns:p14="http://schemas.microsoft.com/office/powerpoint/2010/main" val="1336546276"/>
       </p:ext>
     </p:extLst>
   </p:cSld>
@@ -13107,6 +13281,161 @@
       </p:sp>
       <p:sp>
         <p:nvSpPr>
+          <p:cNvPr id="3" name="Prostokąt zaokrąglony 2"/>
+          <p:cNvSpPr/>
+          <p:nvPr/>
+        </p:nvSpPr>
+        <p:spPr>
+          <a:xfrm>
+            <a:off x="1609595" y="1546963"/>
+            <a:ext cx="5730657" cy="1991639"/>
+          </a:xfrm>
+          <a:prstGeom prst="roundRect">
+            <a:avLst/>
+          </a:prstGeom>
+          <a:ln/>
+        </p:spPr>
+        <p:style>
+          <a:lnRef idx="2">
+            <a:schemeClr val="accent3">
+              <a:shade val="50000"/>
+            </a:schemeClr>
+          </a:lnRef>
+          <a:fillRef idx="1">
+            <a:schemeClr val="accent3"/>
+          </a:fillRef>
+          <a:effectRef idx="0">
+            <a:schemeClr val="accent3"/>
+          </a:effectRef>
+          <a:fontRef idx="minor">
+            <a:schemeClr val="lt1"/>
+          </a:fontRef>
+        </p:style>
+        <p:txBody>
+          <a:bodyPr lIns="108000" tIns="108000" rIns="108000" bIns="108000" rtlCol="0" anchor="ctr"/>
+          <a:lstStyle/>
+          <a:p>
+            <a:pPr algn="ctr"/>
+            <a:r>
+              <a:rPr lang="pl-PL" sz="1600" dirty="0" smtClean="0">
+                <a:solidFill>
+                  <a:schemeClr val="tx1"/>
+                </a:solidFill>
+              </a:rPr>
+              <a:t>Ćwiczenie 3</a:t>
+            </a:r>
+          </a:p>
+          <a:p>
+            <a:pPr algn="ctr"/>
+            <a:r>
+              <a:rPr lang="pl-PL" sz="1600" dirty="0" smtClean="0"/>
+              <a:t>REST - </a:t>
+            </a:r>
+            <a:r>
+              <a:rPr lang="pl-PL" sz="1600" dirty="0" err="1" smtClean="0"/>
+              <a:t>server</a:t>
+            </a:r>
+            <a:endParaRPr lang="pl-PL" sz="1600" dirty="0" smtClean="0">
+              <a:solidFill>
+                <a:schemeClr val="tx1"/>
+              </a:solidFill>
+            </a:endParaRPr>
+          </a:p>
+        </p:txBody>
+      </p:sp>
+    </p:spTree>
+    <p:extLst>
+      <p:ext uri="{BB962C8B-B14F-4D97-AF65-F5344CB8AC3E}">
+        <p14:creationId xmlns:p14="http://schemas.microsoft.com/office/powerpoint/2010/main" val="2042540814"/>
+      </p:ext>
+    </p:extLst>
+  </p:cSld>
+  <p:clrMapOvr>
+    <a:masterClrMapping/>
+  </p:clrMapOvr>
+  <mc:AlternateContent xmlns:mc="http://schemas.openxmlformats.org/markup-compatibility/2006" xmlns:p14="http://schemas.microsoft.com/office/powerpoint/2010/main">
+    <mc:Choice Requires="p14">
+      <p:transition p14:dur="10"/>
+    </mc:Choice>
+    <mc:Fallback xmlns="">
+      <p:transition/>
+    </mc:Fallback>
+  </mc:AlternateContent>
+  <p:timing>
+    <p:tnLst>
+      <p:par>
+        <p:cTn id="1" dur="indefinite" restart="never" nodeType="tmRoot"/>
+      </p:par>
+    </p:tnLst>
+  </p:timing>
+</p:sld>
+</file>
+
+<file path=ppt/slides/slide24.xml><?xml version="1.0" encoding="utf-8"?>
+<p:sld xmlns:a="http://schemas.openxmlformats.org/drawingml/2006/main" xmlns:r="http://schemas.openxmlformats.org/officeDocument/2006/relationships" xmlns:p="http://schemas.openxmlformats.org/presentationml/2006/main">
+  <p:cSld>
+    <p:spTree>
+      <p:nvGrpSpPr>
+        <p:cNvPr id="1" name=""/>
+        <p:cNvGrpSpPr/>
+        <p:nvPr/>
+      </p:nvGrpSpPr>
+      <p:grpSpPr>
+        <a:xfrm>
+          <a:off x="0" y="0"/>
+          <a:ext cx="0" cy="0"/>
+          <a:chOff x="0" y="0"/>
+          <a:chExt cx="0" cy="0"/>
+        </a:xfrm>
+      </p:grpSpPr>
+      <p:sp>
+        <p:nvSpPr>
+          <p:cNvPr id="7" name="Titel 6"/>
+          <p:cNvSpPr>
+            <a:spLocks noGrp="1"/>
+          </p:cNvSpPr>
+          <p:nvPr>
+            <p:ph type="title"/>
+          </p:nvPr>
+        </p:nvSpPr>
+        <p:spPr/>
+        <p:txBody>
+          <a:bodyPr/>
+          <a:lstStyle/>
+          <a:p>
+            <a:r>
+              <a:rPr lang="pl-PL" dirty="0" smtClean="0"/>
+              <a:t>Ćwiczenie REST Server</a:t>
+            </a:r>
+            <a:endParaRPr lang="de-DE" dirty="0"/>
+          </a:p>
+        </p:txBody>
+      </p:sp>
+      <p:sp>
+        <p:nvSpPr>
+          <p:cNvPr id="5" name="Inhaltsplatzhalter 4"/>
+          <p:cNvSpPr>
+            <a:spLocks noGrp="1"/>
+          </p:cNvSpPr>
+          <p:nvPr>
+            <p:ph type="body" sz="quarter" idx="13"/>
+          </p:nvPr>
+        </p:nvSpPr>
+        <p:spPr/>
+        <p:txBody>
+          <a:bodyPr/>
+          <a:lstStyle/>
+          <a:p>
+            <a:r>
+              <a:rPr lang="pl-PL" dirty="0" smtClean="0"/>
+              <a:t>ĆWICZENIE 3</a:t>
+            </a:r>
+            <a:endParaRPr lang="de-DE" dirty="0"/>
+          </a:p>
+        </p:txBody>
+      </p:sp>
+      <p:sp>
+        <p:nvSpPr>
           <p:cNvPr id="6" name="Symbol zastępczy zawartości 1"/>
           <p:cNvSpPr>
             <a:spLocks noGrp="1"/>
@@ -13259,7 +13588,7 @@
 </p:sld>
 </file>
 
-<file path=ppt/slides/slide24.xml><?xml version="1.0" encoding="utf-8"?>
+<file path=ppt/slides/slide25.xml><?xml version="1.0" encoding="utf-8"?>
 <p:sld xmlns:a="http://schemas.openxmlformats.org/drawingml/2006/main" xmlns:r="http://schemas.openxmlformats.org/officeDocument/2006/relationships" xmlns:p="http://schemas.openxmlformats.org/presentationml/2006/main">
   <p:cSld>
     <p:spTree>
@@ -13800,7 +14129,7 @@
 </p:sld>
 </file>
 
-<file path=ppt/slides/slide25.xml><?xml version="1.0" encoding="utf-8"?>
+<file path=ppt/slides/slide26.xml><?xml version="1.0" encoding="utf-8"?>
 <p:sld xmlns:a="http://schemas.openxmlformats.org/drawingml/2006/main" xmlns:r="http://schemas.openxmlformats.org/officeDocument/2006/relationships" xmlns:p="http://schemas.openxmlformats.org/presentationml/2006/main">
   <p:cSld>
     <p:spTree>
@@ -14170,7 +14499,7 @@
 </p:sld>
 </file>
 
-<file path=ppt/slides/slide26.xml><?xml version="1.0" encoding="utf-8"?>
+<file path=ppt/slides/slide27.xml><?xml version="1.0" encoding="utf-8"?>
 <p:sld xmlns:a="http://schemas.openxmlformats.org/drawingml/2006/main" xmlns:r="http://schemas.openxmlformats.org/officeDocument/2006/relationships" xmlns:p="http://schemas.openxmlformats.org/presentationml/2006/main">
   <p:cSld>
     <p:spTree>
@@ -14850,7 +15179,7 @@
 </p:sld>
 </file>
 
-<file path=ppt/slides/slide27.xml><?xml version="1.0" encoding="utf-8"?>
+<file path=ppt/slides/slide28.xml><?xml version="1.0" encoding="utf-8"?>
 <p:sld xmlns:a="http://schemas.openxmlformats.org/drawingml/2006/main" xmlns:r="http://schemas.openxmlformats.org/officeDocument/2006/relationships" xmlns:p="http://schemas.openxmlformats.org/presentationml/2006/main">
   <p:cSld>
     <p:spTree>
@@ -15094,7 +15423,7 @@
 </p:sld>
 </file>
 
-<file path=ppt/slides/slide28.xml><?xml version="1.0" encoding="utf-8"?>
+<file path=ppt/slides/slide29.xml><?xml version="1.0" encoding="utf-8"?>
 <p:sld xmlns:a="http://schemas.openxmlformats.org/drawingml/2006/main" xmlns:r="http://schemas.openxmlformats.org/officeDocument/2006/relationships" xmlns:p="http://schemas.openxmlformats.org/presentationml/2006/main">
   <p:cSld>
     <p:spTree>
@@ -15397,263 +15726,6 @@
 </p:sld>
 </file>
 
-<file path=ppt/slides/slide29.xml><?xml version="1.0" encoding="utf-8"?>
-<p:sld xmlns:a="http://schemas.openxmlformats.org/drawingml/2006/main" xmlns:r="http://schemas.openxmlformats.org/officeDocument/2006/relationships" xmlns:p="http://schemas.openxmlformats.org/presentationml/2006/main">
-  <p:cSld>
-    <p:spTree>
-      <p:nvGrpSpPr>
-        <p:cNvPr id="1" name=""/>
-        <p:cNvGrpSpPr/>
-        <p:nvPr/>
-      </p:nvGrpSpPr>
-      <p:grpSpPr>
-        <a:xfrm>
-          <a:off x="0" y="0"/>
-          <a:ext cx="0" cy="0"/>
-          <a:chOff x="0" y="0"/>
-          <a:chExt cx="0" cy="0"/>
-        </a:xfrm>
-      </p:grpSpPr>
-      <p:sp>
-        <p:nvSpPr>
-          <p:cNvPr id="7" name="Titel 6"/>
-          <p:cNvSpPr>
-            <a:spLocks noGrp="1"/>
-          </p:cNvSpPr>
-          <p:nvPr>
-            <p:ph type="title"/>
-          </p:nvPr>
-        </p:nvSpPr>
-        <p:spPr>
-          <a:xfrm>
-            <a:off x="444503" y="347341"/>
-            <a:ext cx="6692104" cy="436017"/>
-          </a:xfrm>
-        </p:spPr>
-        <p:txBody>
-          <a:bodyPr/>
-          <a:lstStyle/>
-          <a:p>
-            <a:r>
-              <a:rPr lang="pl-PL" dirty="0" smtClean="0"/>
-              <a:t>Ćwiczenie REST </a:t>
-            </a:r>
-            <a:r>
-              <a:rPr lang="pl-PL" dirty="0"/>
-              <a:t>Server</a:t>
-            </a:r>
-            <a:r>
-              <a:rPr lang="pl-PL" dirty="0" smtClean="0"/>
-              <a:t/>
-            </a:r>
-            <a:br>
-              <a:rPr lang="pl-PL" dirty="0" smtClean="0"/>
-            </a:br>
-            <a:r>
-              <a:rPr lang="pl-PL" dirty="0" smtClean="0"/>
-              <a:t>Ćwiczenia z używania REST API</a:t>
-            </a:r>
-            <a:endParaRPr lang="de-DE" dirty="0"/>
-          </a:p>
-        </p:txBody>
-      </p:sp>
-      <p:sp>
-        <p:nvSpPr>
-          <p:cNvPr id="5" name="Inhaltsplatzhalter 4"/>
-          <p:cNvSpPr>
-            <a:spLocks noGrp="1"/>
-          </p:cNvSpPr>
-          <p:nvPr>
-            <p:ph type="body" sz="quarter" idx="13"/>
-          </p:nvPr>
-        </p:nvSpPr>
-        <p:spPr/>
-        <p:txBody>
-          <a:bodyPr/>
-          <a:lstStyle/>
-          <a:p>
-            <a:r>
-              <a:rPr lang="pl-PL" dirty="0" smtClean="0"/>
-              <a:t>ĆWICZENIE 3</a:t>
-            </a:r>
-            <a:endParaRPr lang="de-DE" dirty="0"/>
-          </a:p>
-        </p:txBody>
-      </p:sp>
-      <p:sp>
-        <p:nvSpPr>
-          <p:cNvPr id="30" name="Symbol zastępczy zawartości 1"/>
-          <p:cNvSpPr>
-            <a:spLocks noGrp="1"/>
-          </p:cNvSpPr>
-          <p:nvPr>
-            <p:ph idx="1"/>
-          </p:nvPr>
-        </p:nvSpPr>
-        <p:spPr>
-          <a:xfrm>
-            <a:off x="443708" y="1119187"/>
-            <a:ext cx="3777563" cy="3362325"/>
-          </a:xfrm>
-        </p:spPr>
-        <p:txBody>
-          <a:bodyPr>
-            <a:normAutofit/>
-          </a:bodyPr>
-          <a:lstStyle/>
-          <a:p>
-            <a:r>
-              <a:rPr lang="pl-PL" sz="1050" dirty="0" smtClean="0"/>
-              <a:t>Sprawdźmy, czy gatunek albumu </a:t>
-            </a:r>
-            <a:r>
-              <a:rPr lang="pl-PL" sz="1050" dirty="0" err="1" smtClean="0"/>
-              <a:t>Eurosis</a:t>
-            </a:r>
-            <a:r>
-              <a:rPr lang="pl-PL" sz="1050" dirty="0" smtClean="0"/>
-              <a:t> został zmieniony</a:t>
-            </a:r>
-          </a:p>
-          <a:p>
-            <a:pPr lvl="1"/>
-            <a:r>
-              <a:rPr lang="pl-PL" sz="850" dirty="0" smtClean="0">
-                <a:hlinkClick r:id="rId3"/>
-              </a:rPr>
-              <a:t>GET </a:t>
-            </a:r>
-            <a:r>
-              <a:rPr lang="pl-PL" sz="850" dirty="0" smtClean="0"/>
-              <a:t>http://localhost:8090/products/3</a:t>
-            </a:r>
-          </a:p>
-          <a:p>
-            <a:pPr lvl="1"/>
-            <a:r>
-              <a:rPr lang="pl-PL" sz="850" dirty="0" smtClean="0"/>
-              <a:t>Odpowiedź serwera ma status 404 Not </a:t>
-            </a:r>
-            <a:r>
-              <a:rPr lang="pl-PL" sz="850" dirty="0" err="1" smtClean="0"/>
-              <a:t>Found</a:t>
-            </a:r>
-            <a:endParaRPr lang="pl-PL" sz="850" dirty="0" smtClean="0"/>
-          </a:p>
-          <a:p>
-            <a:pPr lvl="2"/>
-            <a:r>
-              <a:rPr lang="pl-PL" sz="850" dirty="0" smtClean="0"/>
-              <a:t>Po zaimplementowaniu ćwiczenia ma status 200 OK i zawiera informacje o wybranym produkcie</a:t>
-            </a:r>
-          </a:p>
-          <a:p>
-            <a:pPr lvl="2"/>
-            <a:endParaRPr lang="pl-PL" sz="850" dirty="0" smtClean="0"/>
-          </a:p>
-          <a:p>
-            <a:pPr lvl="1"/>
-            <a:endParaRPr lang="pl-PL" sz="850" dirty="0" smtClean="0"/>
-          </a:p>
-          <a:p>
-            <a:endParaRPr lang="pl-PL" dirty="0" smtClean="0"/>
-          </a:p>
-          <a:p>
-            <a:pPr marL="0" indent="0">
-              <a:buNone/>
-            </a:pPr>
-            <a:endParaRPr lang="pl-PL" dirty="0" smtClean="0"/>
-          </a:p>
-          <a:p>
-            <a:endParaRPr lang="pl-PL" dirty="0" smtClean="0"/>
-          </a:p>
-          <a:p>
-            <a:endParaRPr lang="pl-PL" dirty="0" smtClean="0"/>
-          </a:p>
-        </p:txBody>
-      </p:sp>
-      <p:pic>
-        <p:nvPicPr>
-          <p:cNvPr id="14338" name="Picture 2"/>
-          <p:cNvPicPr>
-            <a:picLocks noChangeAspect="1" noChangeArrowheads="1"/>
-          </p:cNvPicPr>
-          <p:nvPr/>
-        </p:nvPicPr>
-        <p:blipFill>
-          <a:blip r:embed="rId4">
-            <a:extLst>
-              <a:ext uri="{28A0092B-C50C-407E-A947-70E740481C1C}">
-                <a14:useLocalDpi xmlns:a14="http://schemas.microsoft.com/office/drawing/2010/main" val="0"/>
-              </a:ext>
-            </a:extLst>
-          </a:blip>
-          <a:srcRect/>
-          <a:stretch>
-            <a:fillRect/>
-          </a:stretch>
-        </p:blipFill>
-        <p:spPr bwMode="auto">
-          <a:xfrm>
-            <a:off x="2095109" y="1921180"/>
-            <a:ext cx="4440216" cy="2472695"/>
-          </a:xfrm>
-          <a:prstGeom prst="rect">
-            <a:avLst/>
-          </a:prstGeom>
-          <a:noFill/>
-          <a:ln>
-            <a:noFill/>
-          </a:ln>
-          <a:extLst>
-            <a:ext uri="{909E8E84-426E-40DD-AFC4-6F175D3DCCD1}">
-              <a14:hiddenFill xmlns:a14="http://schemas.microsoft.com/office/drawing/2010/main">
-                <a:solidFill>
-                  <a:schemeClr val="accent1"/>
-                </a:solidFill>
-              </a14:hiddenFill>
-            </a:ext>
-            <a:ext uri="{91240B29-F687-4F45-9708-019B960494DF}">
-              <a14:hiddenLine xmlns:a14="http://schemas.microsoft.com/office/drawing/2010/main" w="9525">
-                <a:solidFill>
-                  <a:schemeClr val="tx1"/>
-                </a:solidFill>
-                <a:miter lim="800000"/>
-                <a:headEnd/>
-                <a:tailEnd/>
-              </a14:hiddenLine>
-            </a:ext>
-          </a:extLst>
-        </p:spPr>
-      </p:pic>
-    </p:spTree>
-    <p:extLst>
-      <p:ext uri="{BB962C8B-B14F-4D97-AF65-F5344CB8AC3E}">
-        <p14:creationId xmlns:p14="http://schemas.microsoft.com/office/powerpoint/2010/main" val="2788864210"/>
-      </p:ext>
-    </p:extLst>
-  </p:cSld>
-  <p:clrMapOvr>
-    <a:masterClrMapping/>
-  </p:clrMapOvr>
-  <mc:AlternateContent xmlns:mc="http://schemas.openxmlformats.org/markup-compatibility/2006" xmlns:p14="http://schemas.microsoft.com/office/powerpoint/2010/main">
-    <mc:Choice Requires="p14">
-      <p:transition p14:dur="10"/>
-    </mc:Choice>
-    <mc:Fallback xmlns="">
-      <p:transition/>
-    </mc:Fallback>
-  </mc:AlternateContent>
-  <p:timing>
-    <p:tnLst>
-      <p:par>
-        <p:cTn id="1" dur="indefinite" restart="never" nodeType="tmRoot"/>
-      </p:par>
-    </p:tnLst>
-  </p:timing>
-</p:sld>
-</file>
-
 <file path=ppt/slides/slide3.xml><?xml version="1.0" encoding="utf-8"?>
 <p:sld xmlns:a="http://schemas.openxmlformats.org/drawingml/2006/main" xmlns:r="http://schemas.openxmlformats.org/officeDocument/2006/relationships" xmlns:p="http://schemas.openxmlformats.org/presentationml/2006/main">
   <p:cSld>
@@ -15808,28 +15880,15 @@
             <a:pPr lvl="1"/>
             <a:r>
               <a:rPr lang="pl-PL" dirty="0" smtClean="0"/>
-              <a:t>REST </a:t>
-            </a:r>
-            <a:r>
-              <a:rPr lang="pl-PL" dirty="0" smtClean="0"/>
-              <a:t>– manipulowanie </a:t>
-            </a:r>
-            <a:r>
-              <a:rPr lang="pl-PL" dirty="0" smtClean="0"/>
-              <a:t>reprezentacją zasobów sieciowych przy użyciu ujednoliconego zestawu bezstanowych operacji.</a:t>
+              <a:t>REST – manipulowanie reprezentacją zasobów sieciowych przy użyciu ujednoliconego zestawu bezstanowych operacji.</a:t>
             </a:r>
           </a:p>
           <a:p>
             <a:pPr lvl="1"/>
             <a:r>
               <a:rPr lang="pl-PL" dirty="0" smtClean="0"/>
-              <a:t>SOAP </a:t>
-            </a:r>
-            <a:r>
-              <a:rPr lang="pl-PL" dirty="0" smtClean="0"/>
-              <a:t>– bazuje na wymianie ustrukturyzowanej informacji opisanej przy użyciu języka XML.</a:t>
-            </a:r>
-            <a:endParaRPr lang="pl-PL" dirty="0" smtClean="0"/>
+              <a:t>SOAP – bazuje na wymianie ustrukturyzowanej informacji opisanej przy użyciu języka XML.</a:t>
+            </a:r>
           </a:p>
           <a:p>
             <a:pPr lvl="1"/>
@@ -15838,13 +15897,8 @@
           <a:p>
             <a:r>
               <a:rPr lang="pl-PL" dirty="0" smtClean="0"/>
-              <a:t>Dalsza część prezentacji skupia się na usługach REST. </a:t>
-            </a:r>
-            <a:r>
-              <a:rPr lang="pl-PL" dirty="0" smtClean="0"/>
-              <a:t>Usługi SOAP będą przedmiotem następnych zajęć.</a:t>
-            </a:r>
-            <a:endParaRPr lang="pl-PL" dirty="0" smtClean="0"/>
+              <a:t>Dalsza część prezentacji skupia się na usługach REST. Usługi SOAP będą przedmiotem następnych zajęć.</a:t>
+            </a:r>
           </a:p>
         </p:txBody>
       </p:sp>
@@ -16137,6 +16191,263 @@
         <p:spPr>
           <a:xfrm>
             <a:off x="443708" y="1119187"/>
+            <a:ext cx="3777563" cy="3362325"/>
+          </a:xfrm>
+        </p:spPr>
+        <p:txBody>
+          <a:bodyPr>
+            <a:normAutofit/>
+          </a:bodyPr>
+          <a:lstStyle/>
+          <a:p>
+            <a:r>
+              <a:rPr lang="pl-PL" sz="1050" dirty="0" smtClean="0"/>
+              <a:t>Sprawdźmy, czy gatunek albumu </a:t>
+            </a:r>
+            <a:r>
+              <a:rPr lang="pl-PL" sz="1050" dirty="0" err="1" smtClean="0"/>
+              <a:t>Eurosis</a:t>
+            </a:r>
+            <a:r>
+              <a:rPr lang="pl-PL" sz="1050" dirty="0" smtClean="0"/>
+              <a:t> został zmieniony</a:t>
+            </a:r>
+          </a:p>
+          <a:p>
+            <a:pPr lvl="1"/>
+            <a:r>
+              <a:rPr lang="pl-PL" sz="850" dirty="0" smtClean="0">
+                <a:hlinkClick r:id="rId3"/>
+              </a:rPr>
+              <a:t>GET </a:t>
+            </a:r>
+            <a:r>
+              <a:rPr lang="pl-PL" sz="850" dirty="0" smtClean="0"/>
+              <a:t>http://localhost:8090/products/3</a:t>
+            </a:r>
+          </a:p>
+          <a:p>
+            <a:pPr lvl="1"/>
+            <a:r>
+              <a:rPr lang="pl-PL" sz="850" dirty="0" smtClean="0"/>
+              <a:t>Odpowiedź serwera ma status 404 Not </a:t>
+            </a:r>
+            <a:r>
+              <a:rPr lang="pl-PL" sz="850" dirty="0" err="1" smtClean="0"/>
+              <a:t>Found</a:t>
+            </a:r>
+            <a:endParaRPr lang="pl-PL" sz="850" dirty="0" smtClean="0"/>
+          </a:p>
+          <a:p>
+            <a:pPr lvl="2"/>
+            <a:r>
+              <a:rPr lang="pl-PL" sz="850" dirty="0" smtClean="0"/>
+              <a:t>Po zaimplementowaniu ćwiczenia ma status 200 OK i zawiera informacje o wybranym produkcie</a:t>
+            </a:r>
+          </a:p>
+          <a:p>
+            <a:pPr lvl="2"/>
+            <a:endParaRPr lang="pl-PL" sz="850" dirty="0" smtClean="0"/>
+          </a:p>
+          <a:p>
+            <a:pPr lvl="1"/>
+            <a:endParaRPr lang="pl-PL" sz="850" dirty="0" smtClean="0"/>
+          </a:p>
+          <a:p>
+            <a:endParaRPr lang="pl-PL" dirty="0" smtClean="0"/>
+          </a:p>
+          <a:p>
+            <a:pPr marL="0" indent="0">
+              <a:buNone/>
+            </a:pPr>
+            <a:endParaRPr lang="pl-PL" dirty="0" smtClean="0"/>
+          </a:p>
+          <a:p>
+            <a:endParaRPr lang="pl-PL" dirty="0" smtClean="0"/>
+          </a:p>
+          <a:p>
+            <a:endParaRPr lang="pl-PL" dirty="0" smtClean="0"/>
+          </a:p>
+        </p:txBody>
+      </p:sp>
+      <p:pic>
+        <p:nvPicPr>
+          <p:cNvPr id="14338" name="Picture 2"/>
+          <p:cNvPicPr>
+            <a:picLocks noChangeAspect="1" noChangeArrowheads="1"/>
+          </p:cNvPicPr>
+          <p:nvPr/>
+        </p:nvPicPr>
+        <p:blipFill>
+          <a:blip r:embed="rId4">
+            <a:extLst>
+              <a:ext uri="{28A0092B-C50C-407E-A947-70E740481C1C}">
+                <a14:useLocalDpi xmlns:a14="http://schemas.microsoft.com/office/drawing/2010/main" val="0"/>
+              </a:ext>
+            </a:extLst>
+          </a:blip>
+          <a:srcRect/>
+          <a:stretch>
+            <a:fillRect/>
+          </a:stretch>
+        </p:blipFill>
+        <p:spPr bwMode="auto">
+          <a:xfrm>
+            <a:off x="2095109" y="1921180"/>
+            <a:ext cx="4440216" cy="2472695"/>
+          </a:xfrm>
+          <a:prstGeom prst="rect">
+            <a:avLst/>
+          </a:prstGeom>
+          <a:noFill/>
+          <a:ln>
+            <a:noFill/>
+          </a:ln>
+          <a:extLst>
+            <a:ext uri="{909E8E84-426E-40DD-AFC4-6F175D3DCCD1}">
+              <a14:hiddenFill xmlns:a14="http://schemas.microsoft.com/office/drawing/2010/main">
+                <a:solidFill>
+                  <a:schemeClr val="accent1"/>
+                </a:solidFill>
+              </a14:hiddenFill>
+            </a:ext>
+            <a:ext uri="{91240B29-F687-4F45-9708-019B960494DF}">
+              <a14:hiddenLine xmlns:a14="http://schemas.microsoft.com/office/drawing/2010/main" w="9525">
+                <a:solidFill>
+                  <a:schemeClr val="tx1"/>
+                </a:solidFill>
+                <a:miter lim="800000"/>
+                <a:headEnd/>
+                <a:tailEnd/>
+              </a14:hiddenLine>
+            </a:ext>
+          </a:extLst>
+        </p:spPr>
+      </p:pic>
+    </p:spTree>
+    <p:extLst>
+      <p:ext uri="{BB962C8B-B14F-4D97-AF65-F5344CB8AC3E}">
+        <p14:creationId xmlns:p14="http://schemas.microsoft.com/office/powerpoint/2010/main" val="2788864210"/>
+      </p:ext>
+    </p:extLst>
+  </p:cSld>
+  <p:clrMapOvr>
+    <a:masterClrMapping/>
+  </p:clrMapOvr>
+  <mc:AlternateContent xmlns:mc="http://schemas.openxmlformats.org/markup-compatibility/2006" xmlns:p14="http://schemas.microsoft.com/office/powerpoint/2010/main">
+    <mc:Choice Requires="p14">
+      <p:transition p14:dur="10"/>
+    </mc:Choice>
+    <mc:Fallback xmlns="">
+      <p:transition/>
+    </mc:Fallback>
+  </mc:AlternateContent>
+  <p:timing>
+    <p:tnLst>
+      <p:par>
+        <p:cTn id="1" dur="indefinite" restart="never" nodeType="tmRoot"/>
+      </p:par>
+    </p:tnLst>
+  </p:timing>
+</p:sld>
+</file>
+
+<file path=ppt/slides/slide31.xml><?xml version="1.0" encoding="utf-8"?>
+<p:sld xmlns:a="http://schemas.openxmlformats.org/drawingml/2006/main" xmlns:r="http://schemas.openxmlformats.org/officeDocument/2006/relationships" xmlns:p="http://schemas.openxmlformats.org/presentationml/2006/main">
+  <p:cSld>
+    <p:spTree>
+      <p:nvGrpSpPr>
+        <p:cNvPr id="1" name=""/>
+        <p:cNvGrpSpPr/>
+        <p:nvPr/>
+      </p:nvGrpSpPr>
+      <p:grpSpPr>
+        <a:xfrm>
+          <a:off x="0" y="0"/>
+          <a:ext cx="0" cy="0"/>
+          <a:chOff x="0" y="0"/>
+          <a:chExt cx="0" cy="0"/>
+        </a:xfrm>
+      </p:grpSpPr>
+      <p:sp>
+        <p:nvSpPr>
+          <p:cNvPr id="7" name="Titel 6"/>
+          <p:cNvSpPr>
+            <a:spLocks noGrp="1"/>
+          </p:cNvSpPr>
+          <p:nvPr>
+            <p:ph type="title"/>
+          </p:nvPr>
+        </p:nvSpPr>
+        <p:spPr>
+          <a:xfrm>
+            <a:off x="444503" y="347341"/>
+            <a:ext cx="6692104" cy="436017"/>
+          </a:xfrm>
+        </p:spPr>
+        <p:txBody>
+          <a:bodyPr/>
+          <a:lstStyle/>
+          <a:p>
+            <a:r>
+              <a:rPr lang="pl-PL" dirty="0" smtClean="0"/>
+              <a:t>Ćwiczenie REST </a:t>
+            </a:r>
+            <a:r>
+              <a:rPr lang="pl-PL" dirty="0"/>
+              <a:t>Server</a:t>
+            </a:r>
+            <a:r>
+              <a:rPr lang="pl-PL" dirty="0" smtClean="0"/>
+              <a:t/>
+            </a:r>
+            <a:br>
+              <a:rPr lang="pl-PL" dirty="0" smtClean="0"/>
+            </a:br>
+            <a:r>
+              <a:rPr lang="pl-PL" dirty="0" smtClean="0"/>
+              <a:t>Ćwiczenia z używania REST API</a:t>
+            </a:r>
+            <a:endParaRPr lang="de-DE" dirty="0"/>
+          </a:p>
+        </p:txBody>
+      </p:sp>
+      <p:sp>
+        <p:nvSpPr>
+          <p:cNvPr id="5" name="Inhaltsplatzhalter 4"/>
+          <p:cNvSpPr>
+            <a:spLocks noGrp="1"/>
+          </p:cNvSpPr>
+          <p:nvPr>
+            <p:ph type="body" sz="quarter" idx="13"/>
+          </p:nvPr>
+        </p:nvSpPr>
+        <p:spPr/>
+        <p:txBody>
+          <a:bodyPr/>
+          <a:lstStyle/>
+          <a:p>
+            <a:r>
+              <a:rPr lang="pl-PL" dirty="0" smtClean="0"/>
+              <a:t>ĆWICZENIE 3</a:t>
+            </a:r>
+            <a:endParaRPr lang="de-DE" dirty="0"/>
+          </a:p>
+        </p:txBody>
+      </p:sp>
+      <p:sp>
+        <p:nvSpPr>
+          <p:cNvPr id="30" name="Symbol zastępczy zawartości 1"/>
+          <p:cNvSpPr>
+            <a:spLocks noGrp="1"/>
+          </p:cNvSpPr>
+          <p:nvPr>
+            <p:ph idx="1"/>
+          </p:nvPr>
+        </p:nvSpPr>
+        <p:spPr>
+          <a:xfrm>
+            <a:off x="443708" y="1119187"/>
             <a:ext cx="6758758" cy="3362325"/>
           </a:xfrm>
         </p:spPr>
@@ -16302,7 +16613,7 @@
 </p:sld>
 </file>
 
-<file path=ppt/slides/slide31.xml><?xml version="1.0" encoding="utf-8"?>
+<file path=ppt/slides/slide32.xml><?xml version="1.0" encoding="utf-8"?>
 <p:sld xmlns:a="http://schemas.openxmlformats.org/drawingml/2006/main" xmlns:r="http://schemas.openxmlformats.org/officeDocument/2006/relationships" xmlns:p="http://schemas.openxmlformats.org/presentationml/2006/main">
   <p:cSld>
     <p:spTree>
@@ -16541,7 +16852,7 @@
 </p:sld>
 </file>
 
-<file path=ppt/slides/slide32.xml><?xml version="1.0" encoding="utf-8"?>
+<file path=ppt/slides/slide33.xml><?xml version="1.0" encoding="utf-8"?>
 <p:sld xmlns:a="http://schemas.openxmlformats.org/drawingml/2006/main" xmlns:r="http://schemas.openxmlformats.org/officeDocument/2006/relationships" xmlns:p="http://schemas.openxmlformats.org/presentationml/2006/main">
   <p:cSld>
     <p:spTree>
@@ -16780,7 +17091,7 @@
 </p:sld>
 </file>
 
-<file path=ppt/slides/slide33.xml><?xml version="1.0" encoding="utf-8"?>
+<file path=ppt/slides/slide34.xml><?xml version="1.0" encoding="utf-8"?>
 <p:sld xmlns:a="http://schemas.openxmlformats.org/drawingml/2006/main" xmlns:r="http://schemas.openxmlformats.org/officeDocument/2006/relationships" xmlns:p="http://schemas.openxmlformats.org/presentationml/2006/main">
   <p:cSld>
     <p:spTree>
@@ -17176,323 +17487,6 @@
     <p:extLst>
       <p:ext uri="{BB962C8B-B14F-4D97-AF65-F5344CB8AC3E}">
         <p14:creationId xmlns:p14="http://schemas.microsoft.com/office/powerpoint/2010/main" val="1953986883"/>
-      </p:ext>
-    </p:extLst>
-  </p:cSld>
-  <p:clrMapOvr>
-    <a:masterClrMapping/>
-  </p:clrMapOvr>
-  <mc:AlternateContent xmlns:mc="http://schemas.openxmlformats.org/markup-compatibility/2006" xmlns:p14="http://schemas.microsoft.com/office/powerpoint/2010/main">
-    <mc:Choice Requires="p14">
-      <p:transition p14:dur="10"/>
-    </mc:Choice>
-    <mc:Fallback xmlns="">
-      <p:transition/>
-    </mc:Fallback>
-  </mc:AlternateContent>
-  <p:timing>
-    <p:tnLst>
-      <p:par>
-        <p:cTn id="1" dur="indefinite" restart="never" nodeType="tmRoot"/>
-      </p:par>
-    </p:tnLst>
-  </p:timing>
-</p:sld>
-</file>
-
-<file path=ppt/slides/slide34.xml><?xml version="1.0" encoding="utf-8"?>
-<p:sld xmlns:a="http://schemas.openxmlformats.org/drawingml/2006/main" xmlns:r="http://schemas.openxmlformats.org/officeDocument/2006/relationships" xmlns:p="http://schemas.openxmlformats.org/presentationml/2006/main">
-  <p:cSld>
-    <p:spTree>
-      <p:nvGrpSpPr>
-        <p:cNvPr id="1" name=""/>
-        <p:cNvGrpSpPr/>
-        <p:nvPr/>
-      </p:nvGrpSpPr>
-      <p:grpSpPr>
-        <a:xfrm>
-          <a:off x="0" y="0"/>
-          <a:ext cx="0" cy="0"/>
-          <a:chOff x="0" y="0"/>
-          <a:chExt cx="0" cy="0"/>
-        </a:xfrm>
-      </p:grpSpPr>
-      <p:sp>
-        <p:nvSpPr>
-          <p:cNvPr id="7" name="Titel 6"/>
-          <p:cNvSpPr>
-            <a:spLocks noGrp="1"/>
-          </p:cNvSpPr>
-          <p:nvPr>
-            <p:ph type="title"/>
-          </p:nvPr>
-        </p:nvSpPr>
-        <p:spPr/>
-        <p:txBody>
-          <a:bodyPr/>
-          <a:lstStyle/>
-          <a:p>
-            <a:r>
-              <a:rPr lang="pl-PL" dirty="0"/>
-              <a:t>Ćwiczenie REST </a:t>
-            </a:r>
-            <a:r>
-              <a:rPr lang="pl-PL" dirty="0" smtClean="0"/>
-              <a:t>Server</a:t>
-            </a:r>
-            <a:endParaRPr lang="de-DE" dirty="0"/>
-          </a:p>
-        </p:txBody>
-      </p:sp>
-      <p:sp>
-        <p:nvSpPr>
-          <p:cNvPr id="5" name="Inhaltsplatzhalter 4"/>
-          <p:cNvSpPr>
-            <a:spLocks noGrp="1"/>
-          </p:cNvSpPr>
-          <p:nvPr>
-            <p:ph type="body" sz="quarter" idx="13"/>
-          </p:nvPr>
-        </p:nvSpPr>
-        <p:spPr/>
-        <p:txBody>
-          <a:bodyPr/>
-          <a:lstStyle/>
-          <a:p>
-            <a:r>
-              <a:rPr lang="pl-PL" dirty="0" smtClean="0"/>
-              <a:t>ĆWICZENIE 3</a:t>
-            </a:r>
-            <a:endParaRPr lang="de-DE" dirty="0"/>
-          </a:p>
-        </p:txBody>
-      </p:sp>
-      <p:sp>
-        <p:nvSpPr>
-          <p:cNvPr id="4" name="Symbol zastępczy zawartości 1"/>
-          <p:cNvSpPr>
-            <a:spLocks noGrp="1"/>
-          </p:cNvSpPr>
-          <p:nvPr>
-            <p:ph idx="1"/>
-          </p:nvPr>
-        </p:nvSpPr>
-        <p:spPr>
-          <a:xfrm>
-            <a:off x="443708" y="1119187"/>
-            <a:ext cx="7986308" cy="3362325"/>
-          </a:xfrm>
-        </p:spPr>
-        <p:txBody>
-          <a:bodyPr>
-            <a:normAutofit/>
-          </a:bodyPr>
-          <a:lstStyle/>
-          <a:p>
-            <a:r>
-              <a:rPr lang="pl-PL" dirty="0" smtClean="0"/>
-              <a:t>Zadanie: </a:t>
-            </a:r>
-            <a:r>
-              <a:rPr lang="pl-PL" dirty="0" smtClean="0"/>
-              <a:t>zaimplementuj zasób sieciowy po stronie serwera.</a:t>
-            </a:r>
-          </a:p>
-          <a:p>
-            <a:pPr lvl="1"/>
-            <a:r>
-              <a:rPr lang="pl-PL" dirty="0" smtClean="0"/>
-              <a:t>Infrastruktura (serwer HTTP, deployment aplikacji) jest już zaimplementowany – zapoznaj się.</a:t>
-            </a:r>
-          </a:p>
-          <a:p>
-            <a:pPr lvl="2"/>
-            <a:r>
-              <a:rPr lang="pl-PL" dirty="0" smtClean="0"/>
-              <a:t>Tym razem używamy mechanizmu Context Dependency Injection (CDI) do wstrzykiwania </a:t>
-            </a:r>
-            <a:r>
-              <a:rPr lang="pl-PL" dirty="0"/>
-              <a:t>zależności (</a:t>
-            </a:r>
-            <a:r>
-              <a:rPr lang="pl-PL" dirty="0" smtClean="0"/>
-              <a:t>RecordInventory) </a:t>
-            </a:r>
-            <a:r>
-              <a:rPr lang="pl-PL" dirty="0" smtClean="0"/>
-              <a:t>do zasobów JAX-RS</a:t>
-            </a:r>
-          </a:p>
-          <a:p>
-            <a:pPr lvl="1"/>
-            <a:r>
-              <a:rPr lang="pl-PL" dirty="0" smtClean="0"/>
-              <a:t>Zmodyfikuj </a:t>
-            </a:r>
-            <a:r>
-              <a:rPr lang="pl-PL" dirty="0" smtClean="0"/>
-              <a:t>klasę wdsr.exercise3.record.rest.RecordResource</a:t>
-            </a:r>
-          </a:p>
-          <a:p>
-            <a:pPr lvl="1"/>
-            <a:r>
-              <a:rPr lang="pl-PL" dirty="0" smtClean="0"/>
-              <a:t>Zaimplementuj metody w tej klasie tak, aby działały zgodnie z dokumentacją </a:t>
-            </a:r>
-            <a:r>
-              <a:rPr lang="pl-PL" dirty="0" err="1" smtClean="0"/>
-              <a:t>javadoc</a:t>
-            </a:r>
-            <a:r>
-              <a:rPr lang="pl-PL" dirty="0" smtClean="0"/>
-              <a:t>.</a:t>
-            </a:r>
-          </a:p>
-          <a:p>
-            <a:pPr lvl="2"/>
-            <a:r>
-              <a:rPr lang="pl-PL" dirty="0" smtClean="0"/>
-              <a:t>Serwer używany w testach nasłuchuje pod adresem </a:t>
-            </a:r>
-            <a:r>
-              <a:rPr lang="pl-PL" dirty="0" smtClean="0">
-                <a:hlinkClick r:id="rId3"/>
-              </a:rPr>
-              <a:t>http://localhost:8091</a:t>
-            </a:r>
-            <a:endParaRPr lang="pl-PL" dirty="0" smtClean="0"/>
-          </a:p>
-          <a:p>
-            <a:pPr lvl="3"/>
-            <a:r>
-              <a:rPr lang="pl-PL" dirty="0" smtClean="0"/>
-              <a:t>W razie konfliktu portów (</a:t>
-            </a:r>
-            <a:r>
-              <a:rPr lang="en-US" sz="800" dirty="0"/>
-              <a:t>Address already in use: bind</a:t>
-            </a:r>
-            <a:r>
-              <a:rPr lang="pl-PL" dirty="0" smtClean="0"/>
-              <a:t>) zmień numer portu w klasie </a:t>
-            </a:r>
-            <a:r>
-              <a:rPr lang="pl-PL" dirty="0" err="1" smtClean="0"/>
-              <a:t>RecordResourceTest</a:t>
-            </a:r>
-            <a:r>
-              <a:rPr lang="pl-PL" dirty="0" smtClean="0"/>
-              <a:t>.</a:t>
-            </a:r>
-          </a:p>
-          <a:p>
-            <a:pPr lvl="1"/>
-            <a:r>
-              <a:rPr lang="pl-PL" dirty="0" smtClean="0"/>
-              <a:t>Spójrz na klasę </a:t>
-            </a:r>
-            <a:r>
-              <a:rPr lang="pl-PL" dirty="0" err="1" smtClean="0"/>
-              <a:t>ProductResource</a:t>
-            </a:r>
-            <a:r>
-              <a:rPr lang="pl-PL" dirty="0" smtClean="0"/>
-              <a:t> z ćwiczenia REST Client aby zobaczyć, jak można zaimplementować poszczególne operacje.</a:t>
-            </a:r>
-          </a:p>
-          <a:p>
-            <a:endParaRPr lang="pl-PL" dirty="0" smtClean="0"/>
-          </a:p>
-          <a:p>
-            <a:pPr marL="0" indent="0">
-              <a:buNone/>
-            </a:pPr>
-            <a:endParaRPr lang="pl-PL" dirty="0" smtClean="0"/>
-          </a:p>
-          <a:p>
-            <a:r>
-              <a:rPr lang="pl-PL" dirty="0" smtClean="0"/>
-              <a:t>Zasoby:</a:t>
-            </a:r>
-          </a:p>
-          <a:p>
-            <a:pPr lvl="1"/>
-            <a:r>
-              <a:rPr lang="pl-PL" dirty="0" smtClean="0"/>
-              <a:t>JAX-RS 2.0 </a:t>
-            </a:r>
-            <a:r>
-              <a:rPr lang="pl-PL" dirty="0" err="1" smtClean="0"/>
-              <a:t>JavaDoc</a:t>
-            </a:r>
-            <a:r>
-              <a:rPr lang="pl-PL" dirty="0" smtClean="0"/>
-              <a:t>: </a:t>
-            </a:r>
-            <a:r>
-              <a:rPr lang="pl-PL" dirty="0" smtClean="0">
-                <a:hlinkClick r:id="rId4"/>
-              </a:rPr>
-              <a:t>https</a:t>
-            </a:r>
-            <a:r>
-              <a:rPr lang="pl-PL" dirty="0">
-                <a:hlinkClick r:id="rId4"/>
-              </a:rPr>
-              <a:t>://</a:t>
-            </a:r>
-            <a:r>
-              <a:rPr lang="pl-PL" dirty="0" smtClean="0">
-                <a:hlinkClick r:id="rId4"/>
-              </a:rPr>
-              <a:t>jax-rs-spec.java.net/nonav/2.0-rev-a/apidocs/index.html</a:t>
-            </a:r>
-            <a:endParaRPr lang="pl-PL" dirty="0" smtClean="0"/>
-          </a:p>
-          <a:p>
-            <a:pPr lvl="1"/>
-            <a:r>
-              <a:rPr lang="pl-PL" dirty="0" err="1" smtClean="0"/>
-              <a:t>Building</a:t>
-            </a:r>
-            <a:r>
-              <a:rPr lang="pl-PL" dirty="0" smtClean="0"/>
-              <a:t> </a:t>
-            </a:r>
-            <a:r>
-              <a:rPr lang="pl-PL" dirty="0" err="1" smtClean="0"/>
-              <a:t>RESTful</a:t>
-            </a:r>
-            <a:r>
-              <a:rPr lang="pl-PL" dirty="0" smtClean="0"/>
-              <a:t> Web Services </a:t>
-            </a:r>
-            <a:r>
-              <a:rPr lang="pl-PL" dirty="0"/>
-              <a:t>with JAX-RS: </a:t>
-            </a:r>
-            <a:r>
-              <a:rPr lang="pl-PL" dirty="0">
-                <a:hlinkClick r:id="rId5"/>
-              </a:rPr>
-              <a:t>http://</a:t>
-            </a:r>
-            <a:r>
-              <a:rPr lang="pl-PL" dirty="0" smtClean="0">
-                <a:hlinkClick r:id="rId5"/>
-              </a:rPr>
-              <a:t>docs.oracle.com/javaee/6/tutorial/doc/giepu.html</a:t>
-            </a:r>
-            <a:endParaRPr lang="pl-PL" dirty="0" smtClean="0"/>
-          </a:p>
-        </p:txBody>
-      </p:sp>
-    </p:spTree>
-    <p:extLst>
-      <p:ext uri="{BB962C8B-B14F-4D97-AF65-F5344CB8AC3E}">
-        <p14:creationId xmlns:p14="http://schemas.microsoft.com/office/powerpoint/2010/main" val="3439529518"/>
       </p:ext>
     </p:extLst>
   </p:cSld>
@@ -17536,6 +17530,311 @@
       </p:grpSpPr>
       <p:sp>
         <p:nvSpPr>
+          <p:cNvPr id="7" name="Titel 6"/>
+          <p:cNvSpPr>
+            <a:spLocks noGrp="1"/>
+          </p:cNvSpPr>
+          <p:nvPr>
+            <p:ph type="title"/>
+          </p:nvPr>
+        </p:nvSpPr>
+        <p:spPr/>
+        <p:txBody>
+          <a:bodyPr/>
+          <a:lstStyle/>
+          <a:p>
+            <a:r>
+              <a:rPr lang="pl-PL" dirty="0"/>
+              <a:t>Ćwiczenie REST </a:t>
+            </a:r>
+            <a:r>
+              <a:rPr lang="pl-PL" dirty="0" smtClean="0"/>
+              <a:t>Server</a:t>
+            </a:r>
+            <a:endParaRPr lang="de-DE" dirty="0"/>
+          </a:p>
+        </p:txBody>
+      </p:sp>
+      <p:sp>
+        <p:nvSpPr>
+          <p:cNvPr id="5" name="Inhaltsplatzhalter 4"/>
+          <p:cNvSpPr>
+            <a:spLocks noGrp="1"/>
+          </p:cNvSpPr>
+          <p:nvPr>
+            <p:ph type="body" sz="quarter" idx="13"/>
+          </p:nvPr>
+        </p:nvSpPr>
+        <p:spPr/>
+        <p:txBody>
+          <a:bodyPr/>
+          <a:lstStyle/>
+          <a:p>
+            <a:r>
+              <a:rPr lang="pl-PL" dirty="0" smtClean="0"/>
+              <a:t>ĆWICZENIE 3</a:t>
+            </a:r>
+            <a:endParaRPr lang="de-DE" dirty="0"/>
+          </a:p>
+        </p:txBody>
+      </p:sp>
+      <p:sp>
+        <p:nvSpPr>
+          <p:cNvPr id="4" name="Symbol zastępczy zawartości 1"/>
+          <p:cNvSpPr>
+            <a:spLocks noGrp="1"/>
+          </p:cNvSpPr>
+          <p:nvPr>
+            <p:ph idx="1"/>
+          </p:nvPr>
+        </p:nvSpPr>
+        <p:spPr>
+          <a:xfrm>
+            <a:off x="443708" y="1119187"/>
+            <a:ext cx="7986308" cy="3362325"/>
+          </a:xfrm>
+        </p:spPr>
+        <p:txBody>
+          <a:bodyPr>
+            <a:normAutofit/>
+          </a:bodyPr>
+          <a:lstStyle/>
+          <a:p>
+            <a:r>
+              <a:rPr lang="pl-PL" dirty="0" smtClean="0"/>
+              <a:t>Zadanie: zaimplementuj zasób sieciowy po stronie serwera.</a:t>
+            </a:r>
+          </a:p>
+          <a:p>
+            <a:pPr lvl="1"/>
+            <a:r>
+              <a:rPr lang="pl-PL" dirty="0" smtClean="0"/>
+              <a:t>Infrastruktura (serwer HTTP, deployment aplikacji) jest już zaimplementowany – zapoznaj się.</a:t>
+            </a:r>
+          </a:p>
+          <a:p>
+            <a:pPr lvl="2"/>
+            <a:r>
+              <a:rPr lang="pl-PL" dirty="0" smtClean="0"/>
+              <a:t>Tym razem używamy mechanizmu Context Dependency Injection (CDI) do wstrzykiwania </a:t>
+            </a:r>
+            <a:r>
+              <a:rPr lang="pl-PL" dirty="0"/>
+              <a:t>zależności (</a:t>
+            </a:r>
+            <a:r>
+              <a:rPr lang="pl-PL" dirty="0" smtClean="0"/>
+              <a:t>RecordInventory) do zasobów JAX-RS</a:t>
+            </a:r>
+          </a:p>
+          <a:p>
+            <a:pPr lvl="1"/>
+            <a:r>
+              <a:rPr lang="pl-PL" dirty="0" smtClean="0"/>
+              <a:t>Zmodyfikuj klasę wdsr.exercise3.record.rest.RecordResource</a:t>
+            </a:r>
+          </a:p>
+          <a:p>
+            <a:pPr lvl="1"/>
+            <a:r>
+              <a:rPr lang="pl-PL" dirty="0" smtClean="0"/>
+              <a:t>Zaimplementuj metody w tej klasie tak, aby działały zgodnie z dokumentacją </a:t>
+            </a:r>
+            <a:r>
+              <a:rPr lang="pl-PL" dirty="0" err="1" smtClean="0"/>
+              <a:t>javadoc</a:t>
+            </a:r>
+            <a:r>
+              <a:rPr lang="pl-PL" dirty="0" smtClean="0"/>
+              <a:t>.</a:t>
+            </a:r>
+          </a:p>
+          <a:p>
+            <a:pPr lvl="2"/>
+            <a:r>
+              <a:rPr lang="pl-PL" dirty="0" smtClean="0"/>
+              <a:t>Serwer używany w testach nasłuchuje pod adresem </a:t>
+            </a:r>
+            <a:r>
+              <a:rPr lang="pl-PL" dirty="0" smtClean="0">
+                <a:hlinkClick r:id="rId3"/>
+              </a:rPr>
+              <a:t>http://localhost:8091</a:t>
+            </a:r>
+            <a:endParaRPr lang="pl-PL" dirty="0" smtClean="0"/>
+          </a:p>
+          <a:p>
+            <a:pPr lvl="3"/>
+            <a:r>
+              <a:rPr lang="pl-PL" dirty="0" smtClean="0"/>
+              <a:t>W razie konfliktu portów (</a:t>
+            </a:r>
+            <a:r>
+              <a:rPr lang="en-US" sz="800" dirty="0"/>
+              <a:t>Address already in use: bind</a:t>
+            </a:r>
+            <a:r>
+              <a:rPr lang="pl-PL" dirty="0" smtClean="0"/>
+              <a:t>) zmień numer portu w klasie </a:t>
+            </a:r>
+            <a:r>
+              <a:rPr lang="pl-PL" dirty="0" err="1" smtClean="0"/>
+              <a:t>RecordResourceTest</a:t>
+            </a:r>
+            <a:r>
+              <a:rPr lang="pl-PL" dirty="0" smtClean="0"/>
+              <a:t>.</a:t>
+            </a:r>
+          </a:p>
+          <a:p>
+            <a:pPr lvl="1"/>
+            <a:r>
+              <a:rPr lang="pl-PL" dirty="0" smtClean="0"/>
+              <a:t>Spójrz na klasę </a:t>
+            </a:r>
+            <a:r>
+              <a:rPr lang="pl-PL" dirty="0" err="1" smtClean="0"/>
+              <a:t>ProductResource</a:t>
+            </a:r>
+            <a:r>
+              <a:rPr lang="pl-PL" dirty="0" smtClean="0"/>
+              <a:t> z ćwiczenia REST Client aby zobaczyć, jak można zaimplementować poszczególne operacje.</a:t>
+            </a:r>
+          </a:p>
+          <a:p>
+            <a:endParaRPr lang="pl-PL" dirty="0" smtClean="0"/>
+          </a:p>
+          <a:p>
+            <a:pPr marL="0" indent="0">
+              <a:buNone/>
+            </a:pPr>
+            <a:endParaRPr lang="pl-PL" dirty="0" smtClean="0"/>
+          </a:p>
+          <a:p>
+            <a:r>
+              <a:rPr lang="pl-PL" dirty="0" smtClean="0"/>
+              <a:t>Zasoby:</a:t>
+            </a:r>
+          </a:p>
+          <a:p>
+            <a:pPr lvl="1"/>
+            <a:r>
+              <a:rPr lang="pl-PL" dirty="0" smtClean="0"/>
+              <a:t>JAX-RS 2.0 </a:t>
+            </a:r>
+            <a:r>
+              <a:rPr lang="pl-PL" dirty="0" err="1" smtClean="0"/>
+              <a:t>JavaDoc</a:t>
+            </a:r>
+            <a:r>
+              <a:rPr lang="pl-PL" dirty="0" smtClean="0"/>
+              <a:t>: </a:t>
+            </a:r>
+            <a:r>
+              <a:rPr lang="pl-PL" dirty="0" smtClean="0">
+                <a:hlinkClick r:id="rId4"/>
+              </a:rPr>
+              <a:t>https</a:t>
+            </a:r>
+            <a:r>
+              <a:rPr lang="pl-PL" dirty="0">
+                <a:hlinkClick r:id="rId4"/>
+              </a:rPr>
+              <a:t>://</a:t>
+            </a:r>
+            <a:r>
+              <a:rPr lang="pl-PL" dirty="0" smtClean="0">
+                <a:hlinkClick r:id="rId4"/>
+              </a:rPr>
+              <a:t>jax-rs-spec.java.net/nonav/2.0-rev-a/apidocs/index.html</a:t>
+            </a:r>
+            <a:endParaRPr lang="pl-PL" dirty="0" smtClean="0"/>
+          </a:p>
+          <a:p>
+            <a:pPr lvl="1"/>
+            <a:r>
+              <a:rPr lang="pl-PL" dirty="0" err="1" smtClean="0"/>
+              <a:t>Building</a:t>
+            </a:r>
+            <a:r>
+              <a:rPr lang="pl-PL" dirty="0" smtClean="0"/>
+              <a:t> </a:t>
+            </a:r>
+            <a:r>
+              <a:rPr lang="pl-PL" dirty="0" err="1" smtClean="0"/>
+              <a:t>RESTful</a:t>
+            </a:r>
+            <a:r>
+              <a:rPr lang="pl-PL" dirty="0" smtClean="0"/>
+              <a:t> Web Services </a:t>
+            </a:r>
+            <a:r>
+              <a:rPr lang="pl-PL" dirty="0"/>
+              <a:t>with JAX-RS: </a:t>
+            </a:r>
+            <a:r>
+              <a:rPr lang="pl-PL" dirty="0">
+                <a:hlinkClick r:id="rId5"/>
+              </a:rPr>
+              <a:t>http://</a:t>
+            </a:r>
+            <a:r>
+              <a:rPr lang="pl-PL" dirty="0" smtClean="0">
+                <a:hlinkClick r:id="rId5"/>
+              </a:rPr>
+              <a:t>docs.oracle.com/javaee/6/tutorial/doc/giepu.html</a:t>
+            </a:r>
+            <a:endParaRPr lang="pl-PL" dirty="0" smtClean="0"/>
+          </a:p>
+        </p:txBody>
+      </p:sp>
+    </p:spTree>
+    <p:extLst>
+      <p:ext uri="{BB962C8B-B14F-4D97-AF65-F5344CB8AC3E}">
+        <p14:creationId xmlns:p14="http://schemas.microsoft.com/office/powerpoint/2010/main" val="3439529518"/>
+      </p:ext>
+    </p:extLst>
+  </p:cSld>
+  <p:clrMapOvr>
+    <a:masterClrMapping/>
+  </p:clrMapOvr>
+  <mc:AlternateContent xmlns:mc="http://schemas.openxmlformats.org/markup-compatibility/2006" xmlns:p14="http://schemas.microsoft.com/office/powerpoint/2010/main">
+    <mc:Choice Requires="p14">
+      <p:transition p14:dur="10"/>
+    </mc:Choice>
+    <mc:Fallback xmlns="">
+      <p:transition/>
+    </mc:Fallback>
+  </mc:AlternateContent>
+  <p:timing>
+    <p:tnLst>
+      <p:par>
+        <p:cTn id="1" dur="indefinite" restart="never" nodeType="tmRoot"/>
+      </p:par>
+    </p:tnLst>
+  </p:timing>
+</p:sld>
+</file>
+
+<file path=ppt/slides/slide36.xml><?xml version="1.0" encoding="utf-8"?>
+<p:sld xmlns:a="http://schemas.openxmlformats.org/drawingml/2006/main" xmlns:r="http://schemas.openxmlformats.org/officeDocument/2006/relationships" xmlns:p="http://schemas.openxmlformats.org/presentationml/2006/main">
+  <p:cSld>
+    <p:spTree>
+      <p:nvGrpSpPr>
+        <p:cNvPr id="1" name=""/>
+        <p:cNvGrpSpPr/>
+        <p:nvPr/>
+      </p:nvGrpSpPr>
+      <p:grpSpPr>
+        <a:xfrm>
+          <a:off x="0" y="0"/>
+          <a:ext cx="0" cy="0"/>
+          <a:chOff x="0" y="0"/>
+          <a:chExt cx="0" cy="0"/>
+        </a:xfrm>
+      </p:grpSpPr>
+      <p:sp>
+        <p:nvSpPr>
           <p:cNvPr id="2" name="Untertitel 1"/>
           <p:cNvSpPr>
             <a:spLocks noGrp="1"/>
@@ -17671,11 +17970,7 @@
           <a:p>
             <a:r>
               <a:rPr lang="pl-PL" dirty="0" smtClean="0"/>
-              <a:t>Web </a:t>
-            </a:r>
-            <a:r>
-              <a:rPr lang="pl-PL" dirty="0" smtClean="0"/>
-              <a:t>Services - REST</a:t>
+              <a:t>Web Services - REST</a:t>
             </a:r>
             <a:endParaRPr lang="de-DE" dirty="0"/>
           </a:p>
@@ -17788,11 +18083,7 @@
             <a:pPr lvl="1"/>
             <a:r>
               <a:rPr lang="pl-PL" sz="1050" dirty="0" smtClean="0"/>
-              <a:t>Inne operacje: TRACE, </a:t>
-            </a:r>
-            <a:r>
-              <a:rPr lang="pl-PL" sz="1050" dirty="0" smtClean="0"/>
-              <a:t>OPTIONS, CONNECT</a:t>
+              <a:t>Inne operacje: TRACE, OPTIONS, CONNECT</a:t>
             </a:r>
           </a:p>
           <a:p>
@@ -17823,13 +18114,8 @@
             <a:pPr lvl="1"/>
             <a:r>
               <a:rPr lang="pl-PL" dirty="0" smtClean="0"/>
-              <a:t>3xx	przekierowanie (np. </a:t>
-            </a:r>
-            <a:r>
-              <a:rPr lang="pl-PL" dirty="0" smtClean="0"/>
-              <a:t>301 Moved Permanently)</a:t>
-            </a:r>
-            <a:endParaRPr lang="pl-PL" dirty="0" smtClean="0"/>
+              <a:t>3xx	przekierowanie (np. 301 Moved Permanently)</a:t>
+            </a:r>
           </a:p>
           <a:p>
             <a:pPr lvl="1"/>
@@ -18541,11 +18827,7 @@
           <a:p>
             <a:r>
               <a:rPr lang="pl-PL" dirty="0" smtClean="0"/>
-              <a:t>Web </a:t>
-            </a:r>
-            <a:r>
-              <a:rPr lang="pl-PL" dirty="0" smtClean="0"/>
-              <a:t>Services - REST</a:t>
+              <a:t>Web Services - REST</a:t>
             </a:r>
             <a:endParaRPr lang="de-DE" dirty="0"/>
           </a:p>
@@ -19055,11 +19337,7 @@
           <a:p>
             <a:r>
               <a:rPr lang="pl-PL" dirty="0" smtClean="0"/>
-              <a:t>Web </a:t>
-            </a:r>
-            <a:r>
-              <a:rPr lang="pl-PL" dirty="0" smtClean="0"/>
-              <a:t>Services - REST</a:t>
+              <a:t>Web Services - REST</a:t>
             </a:r>
             <a:endParaRPr lang="de-DE" dirty="0"/>
           </a:p>
@@ -20133,7 +20411,7 @@
   <a:extraClrSchemeLst/>
   <a:extLst>
     <a:ext uri="{05A4C25C-085E-4340-85A3-A5531E510DB2}">
-      <thm15:themeFamily xmlns:thm15="http://schemas.microsoft.com/office/thememl/2012/main" name="GFT_Chartpool_2015.pptx" id="{A28C9458-9558-44C8-89F4-D7A2CBC04405}" vid="{0F156D25-70FA-498B-891B-4FDE46BF1046}"/>
+      <thm15:themeFamily xmlns:thm15="http://schemas.microsoft.com/office/thememl/2012/main" xmlns="" name="GFT_Chartpool_2015.pptx" id="{A28C9458-9558-44C8-89F4-D7A2CBC04405}" vid="{0F156D25-70FA-498B-891B-4FDE46BF1046}"/>
     </a:ext>
   </a:extLst>
 </a:theme>
@@ -20780,38 +21058,12 @@
 </file>
 
 <file path=customXml/item1.xml><?xml version="1.0" encoding="utf-8"?>
-<p:properties xmlns:p="http://schemas.microsoft.com/office/2006/metadata/properties" xmlns:xsi="http://www.w3.org/2001/XMLSchema-instance" xmlns:pc="http://schemas.microsoft.com/office/infopath/2007/PartnerControls">
-  <documentManagement>
-    <_dlc_DocId xmlns="727178e8-9586-4f49-8e7b-77af9c2fb085">CVD5QAC74SYH-2-13943</_dlc_DocId>
-    <_dlc_DocIdUrl xmlns="727178e8-9586-4f49-8e7b-77af9c2fb085">
-      <Url>https://share.gft.com/sites/Corporate-Marketing/_layouts/DocIdRedir.aspx?ID=CVD5QAC74SYH-2-13943</Url>
-      <Description>CVD5QAC74SYH-2-13943</Description>
-    </_dlc_DocIdUrl>
-    <Functional_x0020_Area xmlns="e44e039f-c551-4112-981c-456f1b630ef1">Functional Area 1</Functional_x0020_Area>
-    <Reference_x0020_Title xmlns="e44e039f-c551-4112-981c-456f1b630ef1" xsi:nil="true"/>
-    <Area xmlns="e44e039f-c551-4112-981c-456f1b630ef1">Area 1</Area>
-    <Project_x0020_size_x0020__x0028_resources_x0029_ xmlns="e44e039f-c551-4112-981c-456f1b630ef1" xsi:nil="true"/>
-    <Comments xmlns="e44e039f-c551-4112-981c-456f1b630ef1" xsi:nil="true"/>
-    <Business_x0020_Sector xmlns="e44e039f-c551-4112-981c-456f1b630ef1">Banking</Business_x0020_Sector>
-    <Client_x0020_Category xmlns="e44e039f-c551-4112-981c-456f1b630ef1">Central</Client_x0020_Category>
-    <Methods_x0020_and_x0020_standards xmlns="e44e039f-c551-4112-981c-456f1b630ef1" xsi:nil="true"/>
-    <Responsible xmlns="e44e039f-c551-4112-981c-456f1b630ef1">Marek Strejczek</Responsible>
-    <Client_x0020_Name xmlns="e44e039f-c551-4112-981c-456f1b630ef1" xsi:nil="true"/>
-    <Client_x0020_approval xmlns="e44e039f-c551-4112-981c-456f1b630ef1">No</Client_x0020_approval>
-    <Plattform_x0020__x0026__x0020_tools xmlns="e44e039f-c551-4112-981c-456f1b630ef1" xsi:nil="true"/>
-    <Project_x0020_ID xmlns="e44e039f-c551-4112-981c-456f1b630ef1" xsi:nil="true"/>
-    <Description0 xmlns="e44e039f-c551-4112-981c-456f1b630ef1" xsi:nil="true"/>
-    <Author_x0020__x002f__x0020_Contact xmlns="e44e039f-c551-4112-981c-456f1b630ef1">
-      <UserInfo>
-        <DisplayName/>
-        <AccountId xsi:nil="true"/>
-        <AccountType/>
-      </UserInfo>
-    </Author_x0020__x002f__x0020_Contact>
-    <Client_x0020_Country xmlns="e44e039f-c551-4112-981c-456f1b630ef1">Germany</Client_x0020_Country>
-    <Year xmlns="e44e039f-c551-4112-981c-456f1b630ef1" xsi:nil="true"/>
-  </documentManagement>
-</p:properties>
+<?mso-contentType ?>
+<FormTemplates xmlns="http://schemas.microsoft.com/sharepoint/v3/contenttype/forms">
+  <Display>DocumentLibraryForm</Display>
+  <Edit>DocumentLibraryForm</Edit>
+  <New>DocumentLibraryForm</New>
+</FormTemplates>
 </file>
 
 <file path=customXml/item2.xml><?xml version="1.0" encoding="utf-8"?>
@@ -21312,12 +21564,38 @@
 </file>
 
 <file path=customXml/item3.xml><?xml version="1.0" encoding="utf-8"?>
-<?mso-contentType ?>
-<FormTemplates xmlns="http://schemas.microsoft.com/sharepoint/v3/contenttype/forms">
-  <Display>DocumentLibraryForm</Display>
-  <Edit>DocumentLibraryForm</Edit>
-  <New>DocumentLibraryForm</New>
-</FormTemplates>
+<p:properties xmlns:p="http://schemas.microsoft.com/office/2006/metadata/properties" xmlns:xsi="http://www.w3.org/2001/XMLSchema-instance" xmlns:pc="http://schemas.microsoft.com/office/infopath/2007/PartnerControls">
+  <documentManagement>
+    <_dlc_DocId xmlns="727178e8-9586-4f49-8e7b-77af9c2fb085">CVD5QAC74SYH-2-13943</_dlc_DocId>
+    <_dlc_DocIdUrl xmlns="727178e8-9586-4f49-8e7b-77af9c2fb085">
+      <Url>https://share.gft.com/sites/Corporate-Marketing/_layouts/DocIdRedir.aspx?ID=CVD5QAC74SYH-2-13943</Url>
+      <Description>CVD5QAC74SYH-2-13943</Description>
+    </_dlc_DocIdUrl>
+    <Functional_x0020_Area xmlns="e44e039f-c551-4112-981c-456f1b630ef1">Functional Area 1</Functional_x0020_Area>
+    <Reference_x0020_Title xmlns="e44e039f-c551-4112-981c-456f1b630ef1" xsi:nil="true"/>
+    <Area xmlns="e44e039f-c551-4112-981c-456f1b630ef1">Area 1</Area>
+    <Project_x0020_size_x0020__x0028_resources_x0029_ xmlns="e44e039f-c551-4112-981c-456f1b630ef1" xsi:nil="true"/>
+    <Comments xmlns="e44e039f-c551-4112-981c-456f1b630ef1" xsi:nil="true"/>
+    <Business_x0020_Sector xmlns="e44e039f-c551-4112-981c-456f1b630ef1">Banking</Business_x0020_Sector>
+    <Client_x0020_Category xmlns="e44e039f-c551-4112-981c-456f1b630ef1">Central</Client_x0020_Category>
+    <Methods_x0020_and_x0020_standards xmlns="e44e039f-c551-4112-981c-456f1b630ef1" xsi:nil="true"/>
+    <Responsible xmlns="e44e039f-c551-4112-981c-456f1b630ef1">Marek Strejczek</Responsible>
+    <Client_x0020_Name xmlns="e44e039f-c551-4112-981c-456f1b630ef1" xsi:nil="true"/>
+    <Client_x0020_approval xmlns="e44e039f-c551-4112-981c-456f1b630ef1">No</Client_x0020_approval>
+    <Plattform_x0020__x0026__x0020_tools xmlns="e44e039f-c551-4112-981c-456f1b630ef1" xsi:nil="true"/>
+    <Project_x0020_ID xmlns="e44e039f-c551-4112-981c-456f1b630ef1" xsi:nil="true"/>
+    <Description0 xmlns="e44e039f-c551-4112-981c-456f1b630ef1" xsi:nil="true"/>
+    <Author_x0020__x002f__x0020_Contact xmlns="e44e039f-c551-4112-981c-456f1b630ef1">
+      <UserInfo>
+        <DisplayName/>
+        <AccountId xsi:nil="true"/>
+        <AccountType/>
+      </UserInfo>
+    </Author_x0020__x002f__x0020_Contact>
+    <Client_x0020_Country xmlns="e44e039f-c551-4112-981c-456f1b630ef1">Germany</Client_x0020_Country>
+    <Year xmlns="e44e039f-c551-4112-981c-456f1b630ef1" xsi:nil="true"/>
+  </documentManagement>
+</p:properties>
 </file>
 
 <file path=customXml/item4.xml><?xml version="1.0" encoding="utf-8"?>
@@ -21367,18 +21645,9 @@
 </file>
 
 <file path=customXml/itemProps1.xml><?xml version="1.0" encoding="utf-8"?>
-<ds:datastoreItem xmlns:ds="http://schemas.openxmlformats.org/officeDocument/2006/customXml" ds:itemID="{7445AAF4-B73F-4E3A-B9D2-4DDAE0F1BE8A}">
+<ds:datastoreItem xmlns:ds="http://schemas.openxmlformats.org/officeDocument/2006/customXml" ds:itemID="{9217953E-6BB7-40C6-9A84-608D0A8D65EC}">
   <ds:schemaRefs>
-    <ds:schemaRef ds:uri="http://schemas.microsoft.com/office/2006/documentManagement/types"/>
-    <ds:schemaRef ds:uri="http://schemas.openxmlformats.org/package/2006/metadata/core-properties"/>
-    <ds:schemaRef ds:uri="727178e8-9586-4f49-8e7b-77af9c2fb085"/>
-    <ds:schemaRef ds:uri="http://purl.org/dc/elements/1.1/"/>
-    <ds:schemaRef ds:uri="http://schemas.microsoft.com/office/2006/metadata/properties"/>
-    <ds:schemaRef ds:uri="e44e039f-c551-4112-981c-456f1b630ef1"/>
-    <ds:schemaRef ds:uri="http://purl.org/dc/terms/"/>
-    <ds:schemaRef ds:uri="http://schemas.microsoft.com/office/infopath/2007/PartnerControls"/>
-    <ds:schemaRef ds:uri="http://www.w3.org/XML/1998/namespace"/>
-    <ds:schemaRef ds:uri="http://purl.org/dc/dcmitype/"/>
+    <ds:schemaRef ds:uri="http://schemas.microsoft.com/sharepoint/v3/contenttype/forms"/>
   </ds:schemaRefs>
 </ds:datastoreItem>
 </file>
@@ -21403,9 +21672,18 @@
 </file>
 
 <file path=customXml/itemProps3.xml><?xml version="1.0" encoding="utf-8"?>
-<ds:datastoreItem xmlns:ds="http://schemas.openxmlformats.org/officeDocument/2006/customXml" ds:itemID="{9217953E-6BB7-40C6-9A84-608D0A8D65EC}">
+<ds:datastoreItem xmlns:ds="http://schemas.openxmlformats.org/officeDocument/2006/customXml" ds:itemID="{7445AAF4-B73F-4E3A-B9D2-4DDAE0F1BE8A}">
   <ds:schemaRefs>
-    <ds:schemaRef ds:uri="http://schemas.microsoft.com/sharepoint/v3/contenttype/forms"/>
+    <ds:schemaRef ds:uri="http://schemas.microsoft.com/office/2006/documentManagement/types"/>
+    <ds:schemaRef ds:uri="http://schemas.openxmlformats.org/package/2006/metadata/core-properties"/>
+    <ds:schemaRef ds:uri="727178e8-9586-4f49-8e7b-77af9c2fb085"/>
+    <ds:schemaRef ds:uri="http://purl.org/dc/elements/1.1/"/>
+    <ds:schemaRef ds:uri="http://schemas.microsoft.com/office/2006/metadata/properties"/>
+    <ds:schemaRef ds:uri="e44e039f-c551-4112-981c-456f1b630ef1"/>
+    <ds:schemaRef ds:uri="http://purl.org/dc/terms/"/>
+    <ds:schemaRef ds:uri="http://schemas.microsoft.com/office/infopath/2007/PartnerControls"/>
+    <ds:schemaRef ds:uri="http://www.w3.org/XML/1998/namespace"/>
+    <ds:schemaRef ds:uri="http://purl.org/dc/dcmitype/"/>
   </ds:schemaRefs>
 </ds:datastoreItem>
 </file>

</xml_diff>

<commit_message>
adjusted for my personal needs
</commit_message>
<xml_diff>
--- a/WDSR - ćwiczenie 3a_REST.pptx
+++ b/WDSR - ćwiczenie 3a_REST.pptx
@@ -147,7 +147,7 @@
   </p:defaultTextStyle>
   <p:extLst>
     <p:ext uri="{EFAFB233-063F-42B5-8137-9DF3F51BA10A}">
-      <p15:sldGuideLst xmlns:p15="http://schemas.microsoft.com/office/powerpoint/2012/main" xmlns="">
+      <p15:sldGuideLst xmlns:p15="http://schemas.microsoft.com/office/powerpoint/2012/main">
         <p15:guide id="1" orient="horz" pos="1620">
           <p15:clr>
             <a:srgbClr val="A4A3A4"/>
@@ -181,7 +181,7 @@
       </p15:sldGuideLst>
     </p:ext>
     <p:ext uri="{2D200454-40CA-4A62-9FC3-DE9A4176ACB9}">
-      <p15:notesGuideLst xmlns:p15="http://schemas.microsoft.com/office/powerpoint/2012/main" xmlns=""/>
+      <p15:notesGuideLst xmlns:p15="http://schemas.microsoft.com/office/powerpoint/2012/main"/>
     </p:ext>
   </p:extLst>
 </p:presentation>
@@ -276,7 +276,7 @@
             <a:fld id="{C4843D26-F355-3844-A4EF-19D4FD875597}" type="datetimeFigureOut">
               <a:rPr lang="de-DE" smtClean="0"/>
               <a:pPr/>
-              <a:t>12.04.2016</a:t>
+              <a:t>22.02.2017</a:t>
             </a:fld>
             <a:endParaRPr lang="de-DE" dirty="0"/>
           </a:p>
@@ -444,7 +444,7 @@
             <a:fld id="{8E2CFE12-C1FB-D740-8B6C-AFB72D5D4002}" type="datetimeFigureOut">
               <a:rPr lang="de-DE" smtClean="0"/>
               <a:pPr/>
-              <a:t>12.04.2016</a:t>
+              <a:t>22.02.2017</a:t>
             </a:fld>
             <a:endParaRPr lang="de-DE" dirty="0"/>
           </a:p>
@@ -4437,7 +4437,7 @@
   </p:timing>
   <p:extLst mod="1">
     <p:ext uri="{DCECCB84-F9BA-43D5-87BE-67443E8EF086}">
-      <p15:sldGuideLst xmlns:p15="http://schemas.microsoft.com/office/powerpoint/2012/main" xmlns="">
+      <p15:sldGuideLst xmlns:p15="http://schemas.microsoft.com/office/powerpoint/2012/main">
         <p15:guide id="1" orient="horz" pos="1221">
           <p15:clr>
             <a:srgbClr val="C35EA4"/>
@@ -4770,7 +4770,7 @@
   </p:clrMapOvr>
   <p:extLst mod="1">
     <p:ext uri="{DCECCB84-F9BA-43D5-87BE-67443E8EF086}">
-      <p15:sldGuideLst xmlns:p15="http://schemas.microsoft.com/office/powerpoint/2012/main" xmlns="">
+      <p15:sldGuideLst xmlns:p15="http://schemas.microsoft.com/office/powerpoint/2012/main">
         <p15:guide id="1" orient="horz" pos="1221">
           <p15:clr>
             <a:srgbClr val="C35EA4"/>
@@ -5509,7 +5509,7 @@
           <a:graphicData uri="http://schemas.openxmlformats.org/presentationml/2006/ole">
             <mc:AlternateContent xmlns:mc="http://schemas.openxmlformats.org/markup-compatibility/2006">
               <mc:Choice xmlns:v="urn:schemas-microsoft-com:vml" Requires="v">
-                <p:oleObj spid="_x0000_s2288" name="think-cell Folie" r:id="rId4" imgW="305" imgH="303" progId="TCLayout.ActiveDocument.1">
+                <p:oleObj spid="_x0000_s2291" name="think-cell Folie" r:id="rId4" imgW="305" imgH="303" progId="TCLayout.ActiveDocument.1">
                   <p:embed/>
                 </p:oleObj>
               </mc:Choice>
@@ -5906,7 +5906,7 @@
           <a:graphicData uri="http://schemas.openxmlformats.org/presentationml/2006/ole">
             <mc:AlternateContent xmlns:mc="http://schemas.openxmlformats.org/markup-compatibility/2006">
               <mc:Choice xmlns:v="urn:schemas-microsoft-com:vml" Requires="v">
-                <p:oleObj spid="_x0000_s1269" name="think-cell Folie" r:id="rId13" imgW="305" imgH="303" progId="TCLayout.ActiveDocument.1">
+                <p:oleObj spid="_x0000_s1272" name="think-cell Folie" r:id="rId13" imgW="305" imgH="303" progId="TCLayout.ActiveDocument.1">
                   <p:embed/>
                 </p:oleObj>
               </mc:Choice>
@@ -7114,7 +7114,7 @@
   </p:txStyles>
   <p:extLst mod="1">
     <p:ext uri="{27BBF7A9-308A-43DC-89C8-2F10F3537804}">
-      <p15:sldGuideLst xmlns:p15="http://schemas.microsoft.com/office/powerpoint/2012/main" xmlns="">
+      <p15:sldGuideLst xmlns:p15="http://schemas.microsoft.com/office/powerpoint/2012/main">
         <p15:guide id="1" pos="283">
           <p15:clr>
             <a:srgbClr val="FBAE40"/>
@@ -7220,8 +7220,8 @@
         </p:nvSpPr>
         <p:spPr>
           <a:xfrm>
-            <a:off x="976312" y="4178885"/>
-            <a:ext cx="5232400" cy="507831"/>
+            <a:off x="976312" y="4009608"/>
+            <a:ext cx="5232400" cy="677108"/>
           </a:xfrm>
         </p:spPr>
         <p:txBody>
@@ -7230,24 +7230,26 @@
           <a:p>
             <a:r>
               <a:rPr lang="pl-PL" dirty="0" smtClean="0"/>
-              <a:t>Marek Strejczek</a:t>
+              <a:t>Autor: Marek Strejczek</a:t>
+            </a:r>
+          </a:p>
+          <a:p>
+            <a:r>
+              <a:rPr lang="pl-PL" dirty="0" smtClean="0"/>
+              <a:t>Prowadzący: Daniel Boguszewicz</a:t>
             </a:r>
             <a:endParaRPr lang="de-DE" dirty="0" smtClean="0"/>
           </a:p>
           <a:p>
             <a:r>
               <a:rPr lang="pl-PL" dirty="0" smtClean="0"/>
-              <a:t>Lato 2016</a:t>
+              <a:t>Lato 2017</a:t>
             </a:r>
           </a:p>
           <a:p>
             <a:r>
               <a:rPr lang="pl-PL" smtClean="0"/>
-              <a:t>Wersja </a:t>
-            </a:r>
-            <a:r>
-              <a:rPr lang="pl-PL" smtClean="0"/>
-              <a:t>1.1</a:t>
+              <a:t>Wersja 1.2</a:t>
             </a:r>
             <a:endParaRPr lang="de-DE" dirty="0"/>
           </a:p>
@@ -9834,7 +9836,6 @@
               <a:rPr lang="pl-PL" sz="1050" dirty="0" smtClean="0"/>
               <a:t>Zapytanie o produkty wybranych typów:</a:t>
             </a:r>
-            <a:endParaRPr lang="pl-PL" sz="1050" dirty="0" smtClean="0"/>
           </a:p>
           <a:p>
             <a:pPr lvl="1"/>
@@ -9842,29 +9843,18 @@
               <a:rPr lang="pl-PL" sz="850" dirty="0" smtClean="0">
                 <a:hlinkClick r:id="rId3"/>
               </a:rPr>
-              <a:t>GET http://</a:t>
-            </a:r>
-            <a:r>
-              <a:rPr lang="pl-PL" sz="850" dirty="0" smtClean="0">
-                <a:hlinkClick r:id="rId3"/>
-              </a:rPr>
-              <a:t>localhost:8090/products</a:t>
+              <a:t>GET http://localhost:8090/products</a:t>
             </a:r>
             <a:r>
               <a:rPr lang="pl-PL" sz="850" dirty="0" smtClean="0"/>
               <a:t>?type=METAL&amp;type=FOOD</a:t>
             </a:r>
-            <a:endParaRPr lang="pl-PL" sz="850" dirty="0" smtClean="0"/>
           </a:p>
           <a:p>
             <a:pPr lvl="1"/>
             <a:r>
               <a:rPr lang="pl-PL" sz="850" dirty="0" smtClean="0"/>
-              <a:t>Odpowiedź serwera ma status 200 OK i zawiera tablicę </a:t>
-            </a:r>
-            <a:r>
-              <a:rPr lang="pl-PL" sz="850" dirty="0" smtClean="0"/>
-              <a:t>wszystkich produktów typu METAL lub FOOD.</a:t>
+              <a:t>Odpowiedź serwera ma status 200 OK i zawiera tablicę wszystkich produktów typu METAL lub FOOD.</a:t>
             </a:r>
           </a:p>
           <a:p>
@@ -17866,7 +17856,7 @@
           <a:p>
             <a:r>
               <a:rPr lang="pl-PL" dirty="0" smtClean="0"/>
-              <a:t>Marek Strejczek</a:t>
+              <a:t>Daniel Boguszewicz</a:t>
             </a:r>
             <a:endParaRPr lang="de-DE" dirty="0"/>
           </a:p>
@@ -17905,8 +17895,12 @@
           </a:p>
           <a:p>
             <a:r>
-              <a:rPr lang="pl-PL" dirty="0" err="1" smtClean="0"/>
-              <a:t>marek.strejczek</a:t>
+              <a:rPr lang="pl-PL"/>
+              <a:t>d</a:t>
+            </a:r>
+            <a:r>
+              <a:rPr lang="pl-PL" smtClean="0"/>
+              <a:t>aniel.boguszewicz</a:t>
             </a:r>
             <a:r>
               <a:rPr lang="de-DE" dirty="0" smtClean="0"/>
@@ -20411,7 +20405,7 @@
   <a:extraClrSchemeLst/>
   <a:extLst>
     <a:ext uri="{05A4C25C-085E-4340-85A3-A5531E510DB2}">
-      <thm15:themeFamily xmlns:thm15="http://schemas.microsoft.com/office/thememl/2012/main" xmlns="" name="GFT_Chartpool_2015.pptx" id="{A28C9458-9558-44C8-89F4-D7A2CBC04405}" vid="{0F156D25-70FA-498B-891B-4FDE46BF1046}"/>
+      <thm15:themeFamily xmlns:thm15="http://schemas.microsoft.com/office/thememl/2012/main" name="GFT_Chartpool_2015.pptx" id="{A28C9458-9558-44C8-89F4-D7A2CBC04405}" vid="{0F156D25-70FA-498B-891B-4FDE46BF1046}"/>
     </a:ext>
   </a:extLst>
 </a:theme>

</xml_diff>